<commit_message>
changes to evaluation metrics fal_neg_rate and tru_pos_rate
</commit_message>
<xml_diff>
--- a/data_mining_prezentacja.pptx
+++ b/data_mining_prezentacja.pptx
@@ -5,7 +5,7 @@
     <p:sldMasterId id="2147483814" r:id="rId1"/>
   </p:sldMasterIdLst>
   <p:notesMasterIdLst>
-    <p:notesMasterId r:id="rId16"/>
+    <p:notesMasterId r:id="rId19"/>
   </p:notesMasterIdLst>
   <p:sldIdLst>
     <p:sldId id="256" r:id="rId2"/>
@@ -22,6 +22,9 @@
     <p:sldId id="265" r:id="rId13"/>
     <p:sldId id="267" r:id="rId14"/>
     <p:sldId id="269" r:id="rId15"/>
+    <p:sldId id="271" r:id="rId16"/>
+    <p:sldId id="270" r:id="rId17"/>
+    <p:sldId id="272" r:id="rId18"/>
   </p:sldIdLst>
   <p:sldSz cx="12192000" cy="6858000"/>
   <p:notesSz cx="6858000" cy="9144000"/>
@@ -7685,7 +7688,7 @@
           <a:p>
             <a:fld id="{06B47C09-1166-C043-B394-6ECE04EBB830}" type="datetimeFigureOut">
               <a:rPr lang="pl-PL" smtClean="0"/>
-              <a:t>21.05.2024</a:t>
+              <a:t>22.05.2024</a:t>
             </a:fld>
             <a:endParaRPr lang="pl-PL"/>
           </a:p>
@@ -8007,6 +8010,25 @@
               <a:t>2. Wskazanie, którzy klienci mają większe szansę stać się ofiarą oszustwa</a:t>
             </a:r>
           </a:p>
+          <a:p>
+            <a:r>
+              <a:rPr lang="pl-PL" dirty="0"/>
+              <a:t>Najważniejszy parametr modelu: Jak najmniej </a:t>
+            </a:r>
+            <a:r>
+              <a:rPr lang="pl-PL" dirty="0" err="1"/>
+              <a:t>false</a:t>
+            </a:r>
+            <a:r>
+              <a:rPr lang="pl-PL" dirty="0"/>
+              <a:t> </a:t>
+            </a:r>
+            <a:r>
+              <a:rPr lang="pl-PL" dirty="0" err="1"/>
+              <a:t>negatives</a:t>
+            </a:r>
+            <a:endParaRPr lang="pl-PL" dirty="0"/>
+          </a:p>
         </p:txBody>
       </p:sp>
       <p:sp>
@@ -8313,7 +8335,62 @@
           <a:bodyPr/>
           <a:lstStyle/>
           <a:p>
-            <a:endParaRPr lang="pl-PL"/>
+            <a:r>
+              <a:rPr lang="pl-PL" dirty="0"/>
+              <a:t>Najważniejszy część każdej z macierzy to lewy dolny róg, im mniej tym lepiej.</a:t>
+            </a:r>
+          </a:p>
+          <a:p>
+            <a:r>
+              <a:rPr lang="pl-PL" dirty="0"/>
+              <a:t>XGB (</a:t>
+            </a:r>
+            <a:r>
+              <a:rPr lang="pl-PL" dirty="0" err="1"/>
+              <a:t>under</a:t>
+            </a:r>
+            <a:r>
+              <a:rPr lang="pl-PL" dirty="0"/>
+              <a:t>) skrajnie przeuczony widać, że praktycznie wszystko daje jako fraud.</a:t>
+            </a:r>
+          </a:p>
+          <a:p>
+            <a:r>
+              <a:rPr lang="pl-PL" dirty="0"/>
+              <a:t>MLP najlepiej sobie poradziło, potem </a:t>
+            </a:r>
+            <a:r>
+              <a:rPr lang="pl-PL" dirty="0" err="1"/>
+              <a:t>Random</a:t>
+            </a:r>
+            <a:r>
+              <a:rPr lang="pl-PL" dirty="0"/>
+              <a:t> </a:t>
+            </a:r>
+            <a:r>
+              <a:rPr lang="pl-PL" dirty="0" err="1"/>
+              <a:t>Forest</a:t>
+            </a:r>
+            <a:r>
+              <a:rPr lang="pl-PL" dirty="0"/>
+              <a:t>. Widać też że modele z </a:t>
+            </a:r>
+            <a:r>
+              <a:rPr lang="pl-PL" dirty="0" err="1"/>
+              <a:t>oversamplingiem</a:t>
+            </a:r>
+            <a:r>
+              <a:rPr lang="pl-PL" dirty="0"/>
+              <a:t> raczej gorzej sobie radziły. Dzięki dużej ilości obserwacji </a:t>
+            </a:r>
+            <a:r>
+              <a:rPr lang="pl-PL" dirty="0" err="1"/>
+              <a:t>undersampling</a:t>
+            </a:r>
+            <a:r>
+              <a:rPr lang="pl-PL" dirty="0"/>
+              <a:t> był wystarczający do uzyskania dobrych wyników i zapewniał krótszy czas trenowania.</a:t>
+            </a:r>
           </a:p>
         </p:txBody>
       </p:sp>
@@ -8397,7 +8474,228 @@
           <a:bodyPr/>
           <a:lstStyle/>
           <a:p>
-            <a:endParaRPr lang="pl-PL" dirty="0"/>
+            <a:r>
+              <a:rPr lang="pl-PL" dirty="0"/>
+              <a:t>Patrząc na </a:t>
+            </a:r>
+            <a:r>
+              <a:rPr lang="pl-PL" dirty="0" err="1"/>
+              <a:t>Recall</a:t>
+            </a:r>
+            <a:r>
+              <a:rPr lang="pl-PL" dirty="0"/>
+              <a:t> i Precision widać, że walidacja była robiona z naciskiem na </a:t>
+            </a:r>
+            <a:r>
+              <a:rPr lang="pl-PL" dirty="0" err="1"/>
+              <a:t>Recall</a:t>
+            </a:r>
+            <a:r>
+              <a:rPr lang="pl-PL" dirty="0"/>
+              <a:t> przez co „trade-</a:t>
+            </a:r>
+            <a:r>
+              <a:rPr lang="pl-PL" dirty="0" err="1"/>
+              <a:t>offem</a:t>
+            </a:r>
+            <a:r>
+              <a:rPr lang="pl-PL" dirty="0"/>
+              <a:t>” tego są niższe wyniki, i w konsekwencji też niski F1 </a:t>
+            </a:r>
+            <a:r>
+              <a:rPr lang="pl-PL" dirty="0" err="1"/>
+              <a:t>score</a:t>
+            </a:r>
+            <a:r>
+              <a:rPr lang="pl-PL" dirty="0"/>
+              <a:t>.</a:t>
+            </a:r>
+          </a:p>
+          <a:p>
+            <a:r>
+              <a:rPr lang="pl-PL" dirty="0" err="1"/>
+              <a:t>Kologomorov</a:t>
+            </a:r>
+            <a:r>
+              <a:rPr lang="pl-PL" dirty="0"/>
+              <a:t> – </a:t>
+            </a:r>
+            <a:r>
+              <a:rPr lang="pl-PL" dirty="0" err="1"/>
+              <a:t>Smirnov</a:t>
+            </a:r>
+            <a:r>
+              <a:rPr lang="pl-PL" dirty="0"/>
+              <a:t> dla rozkładów </a:t>
+            </a:r>
+            <a:r>
+              <a:rPr lang="pl-PL" dirty="0" err="1"/>
+              <a:t>legit</a:t>
+            </a:r>
+            <a:r>
+              <a:rPr lang="pl-PL" dirty="0"/>
+              <a:t> transakcji i fraudów dlatego czym większa wartość tym lepiej (bardziej oddalone rozkłady)</a:t>
+            </a:r>
+          </a:p>
+          <a:p>
+            <a:r>
+              <a:rPr lang="pl-PL" dirty="0" err="1"/>
+              <a:t>Misclass</a:t>
+            </a:r>
+            <a:r>
+              <a:rPr lang="pl-PL" dirty="0"/>
+              <a:t> </a:t>
+            </a:r>
+            <a:r>
+              <a:rPr lang="pl-PL" dirty="0" err="1"/>
+              <a:t>rate</a:t>
+            </a:r>
+            <a:r>
+              <a:rPr lang="pl-PL" dirty="0"/>
+              <a:t> – słaby wskaźnik widać to po XGB (</a:t>
+            </a:r>
+            <a:r>
+              <a:rPr lang="pl-PL" dirty="0" err="1"/>
+              <a:t>oversample</a:t>
+            </a:r>
+            <a:r>
+              <a:rPr lang="pl-PL" dirty="0"/>
+              <a:t>), bo patrząc na </a:t>
+            </a:r>
+            <a:r>
+              <a:rPr lang="pl-PL" dirty="0" err="1"/>
+              <a:t>Recall</a:t>
+            </a:r>
+            <a:r>
+              <a:rPr lang="pl-PL" dirty="0"/>
+              <a:t> i właśnie </a:t>
+            </a:r>
+            <a:r>
+              <a:rPr lang="pl-PL" dirty="0" err="1"/>
+              <a:t>Missclass_rate</a:t>
+            </a:r>
+            <a:r>
+              <a:rPr lang="pl-PL" dirty="0"/>
+              <a:t> widać, że jest „sztucznie napompowany”, że dobre klasyfikacje </a:t>
+            </a:r>
+            <a:r>
+              <a:rPr lang="pl-PL" dirty="0" err="1"/>
+              <a:t>legit</a:t>
+            </a:r>
+            <a:r>
+              <a:rPr lang="pl-PL" dirty="0"/>
+              <a:t> transakcji, a fraudy słabo przewiduje</a:t>
+            </a:r>
+          </a:p>
+          <a:p>
+            <a:r>
+              <a:rPr lang="pl-PL" dirty="0" err="1"/>
+              <a:t>Acc_diff</a:t>
+            </a:r>
+            <a:r>
+              <a:rPr lang="pl-PL" dirty="0"/>
+              <a:t>, </a:t>
+            </a:r>
+            <a:r>
+              <a:rPr lang="pl-PL" dirty="0" err="1"/>
+              <a:t>recall_diff</a:t>
+            </a:r>
+            <a:r>
+              <a:rPr lang="pl-PL" dirty="0"/>
+              <a:t> – </a:t>
+            </a:r>
+            <a:r>
+              <a:rPr lang="pl-PL" dirty="0" err="1"/>
+              <a:t>overfitting</a:t>
+            </a:r>
+            <a:r>
+              <a:rPr lang="pl-PL" dirty="0"/>
+              <a:t> – widać szczególnie przy XGB (</a:t>
+            </a:r>
+            <a:r>
+              <a:rPr lang="pl-PL" dirty="0" err="1"/>
+              <a:t>undersample</a:t>
+            </a:r>
+            <a:r>
+              <a:rPr lang="pl-PL" dirty="0"/>
+              <a:t>)</a:t>
+            </a:r>
+          </a:p>
+          <a:p>
+            <a:r>
+              <a:rPr lang="pl-PL" dirty="0" err="1"/>
+              <a:t>Fal_neg_rate</a:t>
+            </a:r>
+            <a:r>
+              <a:rPr lang="pl-PL" dirty="0"/>
+              <a:t> – ile </a:t>
+            </a:r>
+            <a:r>
+              <a:rPr lang="pl-PL" dirty="0" err="1"/>
+              <a:t>fraudow</a:t>
+            </a:r>
+            <a:r>
+              <a:rPr lang="pl-PL" dirty="0"/>
+              <a:t> zostało zakwalifikowanych jak </a:t>
+            </a:r>
+            <a:r>
+              <a:rPr lang="pl-PL" dirty="0" err="1"/>
+              <a:t>legit</a:t>
+            </a:r>
+            <a:r>
+              <a:rPr lang="pl-PL" dirty="0"/>
+              <a:t> – im mniej tym lepiej najważniejszy wskaźnik – czym mniej tym algorytm przepuszcza mniej fraudów (1-Recall)</a:t>
+            </a:r>
+          </a:p>
+          <a:p>
+            <a:r>
+              <a:rPr lang="pl-PL" dirty="0" err="1"/>
+              <a:t>True_positive</a:t>
+            </a:r>
+            <a:r>
+              <a:rPr lang="pl-PL" dirty="0"/>
+              <a:t> – ile procent </a:t>
+            </a:r>
+            <a:r>
+              <a:rPr lang="pl-PL" dirty="0" err="1"/>
+              <a:t>true</a:t>
+            </a:r>
+            <a:r>
+              <a:rPr lang="pl-PL" dirty="0"/>
+              <a:t> </a:t>
+            </a:r>
+            <a:r>
+              <a:rPr lang="pl-PL" dirty="0" err="1"/>
+              <a:t>positive</a:t>
+            </a:r>
+            <a:r>
+              <a:rPr lang="pl-PL" dirty="0"/>
+              <a:t> </a:t>
+            </a:r>
+            <a:r>
+              <a:rPr lang="pl-PL" dirty="0" err="1"/>
+              <a:t>stanowily</a:t>
+            </a:r>
+            <a:r>
+              <a:rPr lang="pl-PL" dirty="0"/>
+              <a:t> ze wszystkich i </a:t>
+            </a:r>
+            <a:r>
+              <a:rPr lang="pl-PL" dirty="0" err="1"/>
+              <a:t>porownujac</a:t>
+            </a:r>
+            <a:r>
+              <a:rPr lang="pl-PL" dirty="0"/>
+              <a:t> z </a:t>
+            </a:r>
+            <a:r>
+              <a:rPr lang="pl-PL" dirty="0" err="1"/>
+              <a:t>recallem</a:t>
+            </a:r>
+            <a:r>
+              <a:rPr lang="pl-PL" dirty="0"/>
+              <a:t> widać ile to procent wszystkich fraudów</a:t>
+            </a:r>
           </a:p>
         </p:txBody>
       </p:sp>
@@ -8428,6 +8726,273 @@
     <p:extLst>
       <p:ext uri="{BB962C8B-B14F-4D97-AF65-F5344CB8AC3E}">
         <p14:creationId xmlns:p14="http://schemas.microsoft.com/office/powerpoint/2010/main" val="2896812367"/>
+      </p:ext>
+    </p:extLst>
+  </p:cSld>
+  <p:clrMapOvr>
+    <a:masterClrMapping/>
+  </p:clrMapOvr>
+</p:notes>
+</file>
+
+<file path=ppt/notesSlides/notesSlide13.xml><?xml version="1.0" encoding="utf-8"?>
+<p:notes xmlns:a="http://schemas.openxmlformats.org/drawingml/2006/main" xmlns:r="http://schemas.openxmlformats.org/officeDocument/2006/relationships" xmlns:p="http://schemas.openxmlformats.org/presentationml/2006/main">
+  <p:cSld>
+    <p:spTree>
+      <p:nvGrpSpPr>
+        <p:cNvPr id="1" name=""/>
+        <p:cNvGrpSpPr/>
+        <p:nvPr/>
+      </p:nvGrpSpPr>
+      <p:grpSpPr>
+        <a:xfrm>
+          <a:off x="0" y="0"/>
+          <a:ext cx="0" cy="0"/>
+          <a:chOff x="0" y="0"/>
+          <a:chExt cx="0" cy="0"/>
+        </a:xfrm>
+      </p:grpSpPr>
+      <p:sp>
+        <p:nvSpPr>
+          <p:cNvPr id="2" name="Symbol zastępczy obrazu slajdu 1"/>
+          <p:cNvSpPr>
+            <a:spLocks noGrp="1" noRot="1" noChangeAspect="1"/>
+          </p:cNvSpPr>
+          <p:nvPr>
+            <p:ph type="sldImg"/>
+          </p:nvPr>
+        </p:nvSpPr>
+        <p:spPr/>
+      </p:sp>
+      <p:sp>
+        <p:nvSpPr>
+          <p:cNvPr id="3" name="Symbol zastępczy notatek 2"/>
+          <p:cNvSpPr>
+            <a:spLocks noGrp="1"/>
+          </p:cNvSpPr>
+          <p:nvPr>
+            <p:ph type="body" idx="1"/>
+          </p:nvPr>
+        </p:nvSpPr>
+        <p:spPr/>
+        <p:txBody>
+          <a:bodyPr/>
+          <a:lstStyle/>
+          <a:p>
+            <a:r>
+              <a:rPr lang="pl-PL" dirty="0"/>
+              <a:t>Krzywa Precision-</a:t>
+            </a:r>
+            <a:r>
+              <a:rPr lang="pl-PL" dirty="0" err="1"/>
+              <a:t>Recall</a:t>
+            </a:r>
+            <a:r>
+              <a:rPr lang="pl-PL" dirty="0"/>
+              <a:t> bardzo dobrze dopasowana treningowy/</a:t>
+            </a:r>
+            <a:r>
+              <a:rPr lang="pl-PL" dirty="0" err="1"/>
+              <a:t>undersampling</a:t>
+            </a:r>
+            <a:r>
+              <a:rPr lang="pl-PL" dirty="0"/>
+              <a:t> co pokazuje ze nie ma </a:t>
+            </a:r>
+            <a:r>
+              <a:rPr lang="pl-PL" dirty="0" err="1"/>
+              <a:t>overfittingu</a:t>
+            </a:r>
+            <a:r>
+              <a:rPr lang="pl-PL" dirty="0"/>
+              <a:t> </a:t>
+            </a:r>
+          </a:p>
+        </p:txBody>
+      </p:sp>
+      <p:sp>
+        <p:nvSpPr>
+          <p:cNvPr id="4" name="Symbol zastępczy numeru slajdu 3"/>
+          <p:cNvSpPr>
+            <a:spLocks noGrp="1"/>
+          </p:cNvSpPr>
+          <p:nvPr>
+            <p:ph type="sldNum" sz="quarter" idx="5"/>
+          </p:nvPr>
+        </p:nvSpPr>
+        <p:spPr/>
+        <p:txBody>
+          <a:bodyPr/>
+          <a:lstStyle/>
+          <a:p>
+            <a:fld id="{27923013-7ED5-CD46-A014-C0DA3B89A70F}" type="slidenum">
+              <a:rPr lang="pl-PL" smtClean="0"/>
+              <a:t>15</a:t>
+            </a:fld>
+            <a:endParaRPr lang="pl-PL"/>
+          </a:p>
+        </p:txBody>
+      </p:sp>
+    </p:spTree>
+    <p:extLst>
+      <p:ext uri="{BB962C8B-B14F-4D97-AF65-F5344CB8AC3E}">
+        <p14:creationId xmlns:p14="http://schemas.microsoft.com/office/powerpoint/2010/main" val="3265756443"/>
+      </p:ext>
+    </p:extLst>
+  </p:cSld>
+  <p:clrMapOvr>
+    <a:masterClrMapping/>
+  </p:clrMapOvr>
+</p:notes>
+</file>
+
+<file path=ppt/notesSlides/notesSlide14.xml><?xml version="1.0" encoding="utf-8"?>
+<p:notes xmlns:a="http://schemas.openxmlformats.org/drawingml/2006/main" xmlns:r="http://schemas.openxmlformats.org/officeDocument/2006/relationships" xmlns:p="http://schemas.openxmlformats.org/presentationml/2006/main">
+  <p:cSld>
+    <p:spTree>
+      <p:nvGrpSpPr>
+        <p:cNvPr id="1" name=""/>
+        <p:cNvGrpSpPr/>
+        <p:nvPr/>
+      </p:nvGrpSpPr>
+      <p:grpSpPr>
+        <a:xfrm>
+          <a:off x="0" y="0"/>
+          <a:ext cx="0" cy="0"/>
+          <a:chOff x="0" y="0"/>
+          <a:chExt cx="0" cy="0"/>
+        </a:xfrm>
+      </p:grpSpPr>
+      <p:sp>
+        <p:nvSpPr>
+          <p:cNvPr id="2" name="Symbol zastępczy obrazu slajdu 1"/>
+          <p:cNvSpPr>
+            <a:spLocks noGrp="1" noRot="1" noChangeAspect="1"/>
+          </p:cNvSpPr>
+          <p:nvPr>
+            <p:ph type="sldImg"/>
+          </p:nvPr>
+        </p:nvSpPr>
+        <p:spPr/>
+      </p:sp>
+      <p:sp>
+        <p:nvSpPr>
+          <p:cNvPr id="3" name="Symbol zastępczy notatek 2"/>
+          <p:cNvSpPr>
+            <a:spLocks noGrp="1"/>
+          </p:cNvSpPr>
+          <p:nvPr>
+            <p:ph type="body" idx="1"/>
+          </p:nvPr>
+        </p:nvSpPr>
+        <p:spPr/>
+        <p:txBody>
+          <a:bodyPr/>
+          <a:lstStyle/>
+          <a:p>
+            <a:r>
+              <a:rPr lang="pl-PL" dirty="0"/>
+              <a:t>Wzięte z </a:t>
+            </a:r>
+            <a:r>
+              <a:rPr lang="pl-PL" dirty="0" err="1"/>
+              <a:t>random</a:t>
+            </a:r>
+            <a:r>
+              <a:rPr lang="pl-PL" dirty="0"/>
+              <a:t> </a:t>
+            </a:r>
+            <a:r>
+              <a:rPr lang="pl-PL" dirty="0" err="1"/>
+              <a:t>forest</a:t>
+            </a:r>
+            <a:r>
+              <a:rPr lang="pl-PL" dirty="0"/>
+              <a:t> (</a:t>
+            </a:r>
+            <a:r>
+              <a:rPr lang="pl-PL" dirty="0" err="1"/>
+              <a:t>undersample</a:t>
+            </a:r>
+            <a:r>
+              <a:rPr lang="pl-PL" dirty="0"/>
+              <a:t>), ze względu na brak możliwości otrzymania takich informacji z sieci neuronowej</a:t>
+            </a:r>
+          </a:p>
+          <a:p>
+            <a:r>
+              <a:rPr lang="pl-PL" dirty="0"/>
+              <a:t>Najwięcej fraudów pojawiało się w transakcjach z wysoką </a:t>
+            </a:r>
+            <a:r>
+              <a:rPr lang="pl-PL" dirty="0" err="1"/>
+              <a:t>adj_amt</a:t>
+            </a:r>
+            <a:r>
+              <a:rPr lang="pl-PL" dirty="0"/>
+              <a:t> ,czyli dodatkowe opłaty do transakcji takie jak np. przewalutowanie, przy kontach otwartych otwartych przez długi czas (potencjalnie starsi klienci), </a:t>
+            </a:r>
+            <a:r>
+              <a:rPr lang="pl-PL" dirty="0" err="1"/>
+              <a:t>cvv</a:t>
+            </a:r>
+            <a:r>
+              <a:rPr lang="pl-PL" dirty="0"/>
+              <a:t> niektóre mogły zostać rozpowszechnione w jakimś wycieku danych dlatego częścią pojawiały się we fraudach, transakcje X, C możliwe, że są to jakieś typy transakcji prze </a:t>
+            </a:r>
+            <a:r>
+              <a:rPr lang="pl-PL" dirty="0" err="1"/>
+              <a:t>internet</a:t>
+            </a:r>
+            <a:r>
+              <a:rPr lang="pl-PL" dirty="0"/>
+              <a:t>. Też raczej większe kwoty.</a:t>
+            </a:r>
+          </a:p>
+          <a:p>
+            <a:endParaRPr lang="pl-PL" dirty="0"/>
+          </a:p>
+          <a:p>
+            <a:r>
+              <a:rPr lang="pl-PL" dirty="0"/>
+              <a:t>Decyzja biznesowa:</a:t>
+            </a:r>
+          </a:p>
+          <a:p>
+            <a:r>
+              <a:rPr lang="pl-PL" dirty="0"/>
+              <a:t>Dodatkowe edukowanie klientów, którzy posiadają konto od długiego czasu oraz zwrócenie uwagi na transakcje z dodatkowymi opłatami typu przewalutowanie. </a:t>
+            </a:r>
+          </a:p>
+        </p:txBody>
+      </p:sp>
+      <p:sp>
+        <p:nvSpPr>
+          <p:cNvPr id="4" name="Symbol zastępczy numeru slajdu 3"/>
+          <p:cNvSpPr>
+            <a:spLocks noGrp="1"/>
+          </p:cNvSpPr>
+          <p:nvPr>
+            <p:ph type="sldNum" sz="quarter" idx="5"/>
+          </p:nvPr>
+        </p:nvSpPr>
+        <p:spPr/>
+        <p:txBody>
+          <a:bodyPr/>
+          <a:lstStyle/>
+          <a:p>
+            <a:fld id="{27923013-7ED5-CD46-A014-C0DA3B89A70F}" type="slidenum">
+              <a:rPr lang="pl-PL" smtClean="0"/>
+              <a:t>16</a:t>
+            </a:fld>
+            <a:endParaRPr lang="pl-PL"/>
+          </a:p>
+        </p:txBody>
+      </p:sp>
+    </p:spTree>
+    <p:extLst>
+      <p:ext uri="{BB962C8B-B14F-4D97-AF65-F5344CB8AC3E}">
+        <p14:creationId xmlns:p14="http://schemas.microsoft.com/office/powerpoint/2010/main" val="2896227251"/>
       </p:ext>
     </p:extLst>
   </p:cSld>
@@ -10802,6 +11367,57 @@
               <a:t> – ile minimalnie musi być obserwacji żeby zaszedł podział</a:t>
             </a:r>
           </a:p>
+          <a:p>
+            <a:endParaRPr lang="pl-PL" dirty="0"/>
+          </a:p>
+          <a:p>
+            <a:r>
+              <a:rPr lang="pl-PL" dirty="0" err="1"/>
+              <a:t>Cut</a:t>
+            </a:r>
+            <a:r>
+              <a:rPr lang="pl-PL" dirty="0"/>
+              <a:t> –</a:t>
+            </a:r>
+            <a:r>
+              <a:rPr lang="pl-PL" dirty="0" err="1"/>
+              <a:t>offy</a:t>
+            </a:r>
+            <a:r>
+              <a:rPr lang="pl-PL" dirty="0"/>
+              <a:t> ustalane na podstawie statystki </a:t>
+            </a:r>
+            <a:r>
+              <a:rPr lang="pl-PL" dirty="0" err="1"/>
+              <a:t>kolomogorova</a:t>
+            </a:r>
+            <a:r>
+              <a:rPr lang="pl-PL" dirty="0"/>
+              <a:t> – </a:t>
+            </a:r>
+            <a:r>
+              <a:rPr lang="pl-PL" dirty="0" err="1"/>
+              <a:t>smirnova</a:t>
+            </a:r>
+            <a:r>
+              <a:rPr lang="pl-PL" dirty="0"/>
+              <a:t> (we wszystkich przypadkach poza MLP)</a:t>
+            </a:r>
+          </a:p>
+          <a:p>
+            <a:endParaRPr lang="pl-PL" dirty="0"/>
+          </a:p>
+          <a:p>
+            <a:r>
+              <a:rPr lang="pl-PL" dirty="0"/>
+              <a:t>Pozostałe domyślne z </a:t>
+            </a:r>
+            <a:r>
+              <a:rPr lang="pl-PL" dirty="0" err="1"/>
+              <a:t>sklearn</a:t>
+            </a:r>
+            <a:endParaRPr lang="pl-PL" dirty="0"/>
+          </a:p>
         </p:txBody>
       </p:sp>
       <p:sp>
@@ -10946,6 +11562,40 @@
               <a:t> – głębokość drzewa</a:t>
             </a:r>
           </a:p>
+          <a:p>
+            <a:endParaRPr lang="pl-PL" dirty="0"/>
+          </a:p>
+          <a:p>
+            <a:pPr marL="0" marR="0" lvl="0" indent="0" algn="l" defTabSz="914400" rtl="0" eaLnBrk="1" fontAlgn="auto" latinLnBrk="0" hangingPunct="1">
+              <a:lnSpc>
+                <a:spcPct val="100000"/>
+              </a:lnSpc>
+              <a:spcBef>
+                <a:spcPts val="0"/>
+              </a:spcBef>
+              <a:spcAft>
+                <a:spcPts val="0"/>
+              </a:spcAft>
+              <a:buClrTx/>
+              <a:buSzTx/>
+              <a:buFontTx/>
+              <a:buNone/>
+              <a:tabLst/>
+              <a:defRPr/>
+            </a:pPr>
+            <a:r>
+              <a:rPr lang="pl-PL" dirty="0"/>
+              <a:t>Pozostałe domyślne z </a:t>
+            </a:r>
+            <a:r>
+              <a:rPr lang="pl-PL" dirty="0" err="1"/>
+              <a:t>xgb</a:t>
+            </a:r>
+            <a:endParaRPr lang="pl-PL" dirty="0"/>
+          </a:p>
+          <a:p>
+            <a:endParaRPr lang="pl-PL" dirty="0"/>
+          </a:p>
         </p:txBody>
       </p:sp>
       <p:sp>
@@ -11106,6 +11756,37 @@
           <a:p>
             <a:endParaRPr lang="pl-PL" dirty="0"/>
           </a:p>
+          <a:p>
+            <a:pPr marL="0" marR="0" lvl="0" indent="0" algn="l" defTabSz="914400" rtl="0" eaLnBrk="1" fontAlgn="auto" latinLnBrk="0" hangingPunct="1">
+              <a:lnSpc>
+                <a:spcPct val="100000"/>
+              </a:lnSpc>
+              <a:spcBef>
+                <a:spcPts val="0"/>
+              </a:spcBef>
+              <a:spcAft>
+                <a:spcPts val="0"/>
+              </a:spcAft>
+              <a:buClrTx/>
+              <a:buSzTx/>
+              <a:buFontTx/>
+              <a:buNone/>
+              <a:tabLst/>
+              <a:defRPr/>
+            </a:pPr>
+            <a:r>
+              <a:rPr lang="pl-PL" dirty="0"/>
+              <a:t>Pozostałe domyślne z </a:t>
+            </a:r>
+            <a:r>
+              <a:rPr lang="pl-PL" dirty="0" err="1"/>
+              <a:t>lgbm</a:t>
+            </a:r>
+            <a:endParaRPr lang="pl-PL" dirty="0"/>
+          </a:p>
+          <a:p>
+            <a:endParaRPr lang="pl-PL" dirty="0"/>
+          </a:p>
         </p:txBody>
       </p:sp>
       <p:sp>
@@ -11225,6 +11906,33 @@
               <a:t> w ukrytej, 2 neurony na wyjściu</a:t>
             </a:r>
           </a:p>
+          <a:p>
+            <a:endParaRPr lang="pl-PL" dirty="0"/>
+          </a:p>
+          <a:p>
+            <a:r>
+              <a:rPr lang="pl-PL" dirty="0"/>
+              <a:t>Zbiegał się przed 250</a:t>
+            </a:r>
+          </a:p>
+          <a:p>
+            <a:endParaRPr lang="pl-PL" dirty="0"/>
+          </a:p>
+          <a:p>
+            <a:r>
+              <a:rPr lang="pl-PL" dirty="0" err="1"/>
+              <a:t>Pozostale</a:t>
+            </a:r>
+            <a:r>
+              <a:rPr lang="pl-PL" dirty="0"/>
+              <a:t> domyślne z </a:t>
+            </a:r>
+            <a:r>
+              <a:rPr lang="pl-PL" dirty="0" err="1"/>
+              <a:t>sklearn</a:t>
+            </a:r>
+            <a:endParaRPr lang="pl-PL" dirty="0"/>
+          </a:p>
         </p:txBody>
       </p:sp>
       <p:sp>
@@ -11514,7 +12222,7 @@
             <a:fld id="{1449AA12-8195-4182-A7AC-2E7E59DFBDAF}" type="datetimeFigureOut">
               <a:rPr lang="en-US" smtClean="0"/>
               <a:pPr/>
-              <a:t>5/21/24</a:t>
+              <a:t>5/22/24</a:t>
             </a:fld>
             <a:endParaRPr lang="en-US"/>
           </a:p>
@@ -11686,7 +12394,7 @@
             <a:fld id="{1449AA12-8195-4182-A7AC-2E7E59DFBDAF}" type="datetimeFigureOut">
               <a:rPr lang="en-US" smtClean="0"/>
               <a:pPr/>
-              <a:t>5/21/24</a:t>
+              <a:t>5/22/24</a:t>
             </a:fld>
             <a:endParaRPr lang="en-US"/>
           </a:p>
@@ -11868,7 +12576,7 @@
             <a:fld id="{1449AA12-8195-4182-A7AC-2E7E59DFBDAF}" type="datetimeFigureOut">
               <a:rPr lang="en-US" smtClean="0"/>
               <a:pPr/>
-              <a:t>5/21/24</a:t>
+              <a:t>5/22/24</a:t>
             </a:fld>
             <a:endParaRPr lang="en-US"/>
           </a:p>
@@ -12040,7 +12748,7 @@
             <a:fld id="{1449AA12-8195-4182-A7AC-2E7E59DFBDAF}" type="datetimeFigureOut">
               <a:rPr lang="en-US" smtClean="0"/>
               <a:pPr/>
-              <a:t>5/21/24</a:t>
+              <a:t>5/22/24</a:t>
             </a:fld>
             <a:endParaRPr lang="en-US"/>
           </a:p>
@@ -12288,7 +12996,7 @@
             <a:fld id="{1449AA12-8195-4182-A7AC-2E7E59DFBDAF}" type="datetimeFigureOut">
               <a:rPr lang="en-US" smtClean="0"/>
               <a:pPr/>
-              <a:t>5/21/24</a:t>
+              <a:t>5/22/24</a:t>
             </a:fld>
             <a:endParaRPr lang="en-US"/>
           </a:p>
@@ -12522,7 +13230,7 @@
             <a:fld id="{1449AA12-8195-4182-A7AC-2E7E59DFBDAF}" type="datetimeFigureOut">
               <a:rPr lang="en-US" smtClean="0"/>
               <a:pPr/>
-              <a:t>5/21/24</a:t>
+              <a:t>5/22/24</a:t>
             </a:fld>
             <a:endParaRPr lang="en-US"/>
           </a:p>
@@ -12891,7 +13599,7 @@
             <a:fld id="{1449AA12-8195-4182-A7AC-2E7E59DFBDAF}" type="datetimeFigureOut">
               <a:rPr lang="en-US" smtClean="0"/>
               <a:pPr/>
-              <a:t>5/21/24</a:t>
+              <a:t>5/22/24</a:t>
             </a:fld>
             <a:endParaRPr lang="en-US"/>
           </a:p>
@@ -13011,7 +13719,7 @@
             <a:fld id="{1449AA12-8195-4182-A7AC-2E7E59DFBDAF}" type="datetimeFigureOut">
               <a:rPr lang="en-US" smtClean="0"/>
               <a:pPr/>
-              <a:t>5/21/24</a:t>
+              <a:t>5/22/24</a:t>
             </a:fld>
             <a:endParaRPr lang="en-US"/>
           </a:p>
@@ -13108,7 +13816,7 @@
             <a:fld id="{1449AA12-8195-4182-A7AC-2E7E59DFBDAF}" type="datetimeFigureOut">
               <a:rPr lang="en-US" smtClean="0"/>
               <a:pPr/>
-              <a:t>5/21/24</a:t>
+              <a:t>5/22/24</a:t>
             </a:fld>
             <a:endParaRPr lang="en-US"/>
           </a:p>
@@ -13387,7 +14095,7 @@
             <a:fld id="{1449AA12-8195-4182-A7AC-2E7E59DFBDAF}" type="datetimeFigureOut">
               <a:rPr lang="en-US" smtClean="0"/>
               <a:pPr/>
-              <a:t>5/21/24</a:t>
+              <a:t>5/22/24</a:t>
             </a:fld>
             <a:endParaRPr lang="en-US"/>
           </a:p>
@@ -13646,7 +14354,7 @@
             <a:fld id="{1449AA12-8195-4182-A7AC-2E7E59DFBDAF}" type="datetimeFigureOut">
               <a:rPr lang="en-US" smtClean="0"/>
               <a:pPr/>
-              <a:t>5/21/24</a:t>
+              <a:t>5/22/24</a:t>
             </a:fld>
             <a:endParaRPr lang="en-US"/>
           </a:p>
@@ -13861,7 +14569,7 @@
             <a:fld id="{1449AA12-8195-4182-A7AC-2E7E59DFBDAF}" type="datetimeFigureOut">
               <a:rPr lang="en-US" smtClean="0"/>
               <a:pPr/>
-              <a:t>5/21/24</a:t>
+              <a:t>5/22/24</a:t>
             </a:fld>
             <a:endParaRPr lang="en-US"/>
           </a:p>
@@ -15581,8 +16289,8 @@
         </p:blipFill>
         <p:spPr>
           <a:xfrm>
-            <a:off x="1444487" y="1"/>
-            <a:ext cx="9303026" cy="6858000"/>
+            <a:off x="1734641" y="0"/>
+            <a:ext cx="8598731" cy="6338808"/>
           </a:xfrm>
           <a:prstGeom prst="rect">
             <a:avLst/>
@@ -15668,8 +16376,8 @@
         </p:blipFill>
         <p:spPr>
           <a:xfrm>
-            <a:off x="1315278" y="0"/>
-            <a:ext cx="9561444" cy="6858000"/>
+            <a:off x="1770934" y="574352"/>
+            <a:ext cx="8650132" cy="6204357"/>
           </a:xfrm>
           <a:prstGeom prst="rect">
             <a:avLst/>
@@ -16087,10 +16795,10 @@
       </p:sp>
       <p:graphicFrame>
         <p:nvGraphicFramePr>
-          <p:cNvPr id="13" name="Symbol zastępczy zawartości 12">
+          <p:cNvPr id="5" name="Symbol zastępczy zawartości 4">
             <a:extLst>
               <a:ext uri="{FF2B5EF4-FFF2-40B4-BE49-F238E27FC236}">
-                <a16:creationId xmlns:a16="http://schemas.microsoft.com/office/drawing/2014/main" id="{17702A61-C9A5-77A4-C1A6-4776D126EED5}"/>
+                <a16:creationId xmlns:a16="http://schemas.microsoft.com/office/drawing/2014/main" id="{8A7F0664-B25F-C12C-4FC3-D08F6F46BFD6}"/>
               </a:ext>
             </a:extLst>
           </p:cNvPr>
@@ -16101,14 +16809,14 @@
             <p:ph idx="1"/>
             <p:extLst>
               <p:ext uri="{D42A27DB-BD31-4B8C-83A1-F6EECF244321}">
-                <p14:modId xmlns:p14="http://schemas.microsoft.com/office/powerpoint/2010/main" val="1844961062"/>
+                <p14:modId xmlns:p14="http://schemas.microsoft.com/office/powerpoint/2010/main" val="1528647604"/>
               </p:ext>
             </p:extLst>
           </p:nvPr>
         </p:nvGraphicFramePr>
         <p:xfrm>
-          <a:off x="527876" y="2174175"/>
-          <a:ext cx="11127746" cy="3752033"/>
+          <a:off x="865953" y="2168080"/>
+          <a:ext cx="10672536" cy="3484245"/>
         </p:xfrm>
         <a:graphic>
           <a:graphicData uri="http://schemas.openxmlformats.org/drawingml/2006/table">
@@ -16117,99 +16825,99 @@
                 <a:tableStyleId>{5C22544A-7EE6-4342-B048-85BDC9FD1C3A}</a:tableStyleId>
               </a:tblPr>
               <a:tblGrid>
-                <a:gridCol w="1094282">
+                <a:gridCol w="1119618">
                   <a:extLst>
                     <a:ext uri="{9D8B030D-6E8A-4147-A177-3AD203B41FA5}">
-                      <a16:colId xmlns:a16="http://schemas.microsoft.com/office/drawing/2014/main" val="3909419294"/>
+                      <a16:colId xmlns:a16="http://schemas.microsoft.com/office/drawing/2014/main" val="1958733613"/>
                     </a:ext>
                   </a:extLst>
                 </a:gridCol>
-                <a:gridCol w="671337">
+                <a:gridCol w="834317">
                   <a:extLst>
                     <a:ext uri="{9D8B030D-6E8A-4147-A177-3AD203B41FA5}">
-                      <a16:colId xmlns:a16="http://schemas.microsoft.com/office/drawing/2014/main" val="192569475"/>
+                      <a16:colId xmlns:a16="http://schemas.microsoft.com/office/drawing/2014/main" val="3966836244"/>
                     </a:ext>
                   </a:extLst>
                 </a:gridCol>
-                <a:gridCol w="614597">
+                <a:gridCol w="724446">
                   <a:extLst>
                     <a:ext uri="{9D8B030D-6E8A-4147-A177-3AD203B41FA5}">
-                      <a16:colId xmlns:a16="http://schemas.microsoft.com/office/drawing/2014/main" val="95244609"/>
+                      <a16:colId xmlns:a16="http://schemas.microsoft.com/office/drawing/2014/main" val="3844420232"/>
                     </a:ext>
                   </a:extLst>
                 </a:gridCol>
-                <a:gridCol w="599606">
+                <a:gridCol w="541344">
                   <a:extLst>
                     <a:ext uri="{9D8B030D-6E8A-4147-A177-3AD203B41FA5}">
-                      <a16:colId xmlns:a16="http://schemas.microsoft.com/office/drawing/2014/main" val="1621596543"/>
+                      <a16:colId xmlns:a16="http://schemas.microsoft.com/office/drawing/2014/main" val="860647478"/>
                     </a:ext>
                   </a:extLst>
                 </a:gridCol>
-                <a:gridCol w="719528">
+                <a:gridCol w="788134">
                   <a:extLst>
                     <a:ext uri="{9D8B030D-6E8A-4147-A177-3AD203B41FA5}">
-                      <a16:colId xmlns:a16="http://schemas.microsoft.com/office/drawing/2014/main" val="1432333193"/>
+                      <a16:colId xmlns:a16="http://schemas.microsoft.com/office/drawing/2014/main" val="3978138156"/>
                     </a:ext>
                   </a:extLst>
                 </a:gridCol>
-                <a:gridCol w="674558">
+                <a:gridCol w="628915">
                   <a:extLst>
                     <a:ext uri="{9D8B030D-6E8A-4147-A177-3AD203B41FA5}">
-                      <a16:colId xmlns:a16="http://schemas.microsoft.com/office/drawing/2014/main" val="2950675544"/>
+                      <a16:colId xmlns:a16="http://schemas.microsoft.com/office/drawing/2014/main" val="606052349"/>
                     </a:ext>
                   </a:extLst>
                 </a:gridCol>
-                <a:gridCol w="767718">
+                <a:gridCol w="764251">
                   <a:extLst>
                     <a:ext uri="{9D8B030D-6E8A-4147-A177-3AD203B41FA5}">
-                      <a16:colId xmlns:a16="http://schemas.microsoft.com/office/drawing/2014/main" val="2322559439"/>
+                      <a16:colId xmlns:a16="http://schemas.microsoft.com/office/drawing/2014/main" val="1047872173"/>
                     </a:ext>
                   </a:extLst>
                 </a:gridCol>
-                <a:gridCol w="719528">
+                <a:gridCol w="668720">
                   <a:extLst>
                     <a:ext uri="{9D8B030D-6E8A-4147-A177-3AD203B41FA5}">
-                      <a16:colId xmlns:a16="http://schemas.microsoft.com/office/drawing/2014/main" val="1834368256"/>
+                      <a16:colId xmlns:a16="http://schemas.microsoft.com/office/drawing/2014/main" val="2935344109"/>
                     </a:ext>
                   </a:extLst>
                 </a:gridCol>
-                <a:gridCol w="1349115">
+                <a:gridCol w="1385205">
                   <a:extLst>
                     <a:ext uri="{9D8B030D-6E8A-4147-A177-3AD203B41FA5}">
-                      <a16:colId xmlns:a16="http://schemas.microsoft.com/office/drawing/2014/main" val="3662347695"/>
+                      <a16:colId xmlns:a16="http://schemas.microsoft.com/office/drawing/2014/main" val="3120176025"/>
                     </a:ext>
                   </a:extLst>
                 </a:gridCol>
-                <a:gridCol w="854439">
+                <a:gridCol w="613870">
                   <a:extLst>
                     <a:ext uri="{9D8B030D-6E8A-4147-A177-3AD203B41FA5}">
-                      <a16:colId xmlns:a16="http://schemas.microsoft.com/office/drawing/2014/main" val="2556136840"/>
+                      <a16:colId xmlns:a16="http://schemas.microsoft.com/office/drawing/2014/main" val="2803309717"/>
                     </a:ext>
                   </a:extLst>
                 </a:gridCol>
-                <a:gridCol w="1019331">
+                <a:gridCol w="697424">
                   <a:extLst>
                     <a:ext uri="{9D8B030D-6E8A-4147-A177-3AD203B41FA5}">
-                      <a16:colId xmlns:a16="http://schemas.microsoft.com/office/drawing/2014/main" val="4161228171"/>
+                      <a16:colId xmlns:a16="http://schemas.microsoft.com/office/drawing/2014/main" val="181503625"/>
                     </a:ext>
                   </a:extLst>
                 </a:gridCol>
-                <a:gridCol w="869430">
+                <a:gridCol w="798162">
                   <a:extLst>
                     <a:ext uri="{9D8B030D-6E8A-4147-A177-3AD203B41FA5}">
-                      <a16:colId xmlns:a16="http://schemas.microsoft.com/office/drawing/2014/main" val="3157721733"/>
+                      <a16:colId xmlns:a16="http://schemas.microsoft.com/office/drawing/2014/main" val="3566387461"/>
                     </a:ext>
                   </a:extLst>
                 </a:gridCol>
-                <a:gridCol w="1174277">
+                <a:gridCol w="1108130">
                   <a:extLst>
                     <a:ext uri="{9D8B030D-6E8A-4147-A177-3AD203B41FA5}">
-                      <a16:colId xmlns:a16="http://schemas.microsoft.com/office/drawing/2014/main" val="506398051"/>
+                      <a16:colId xmlns:a16="http://schemas.microsoft.com/office/drawing/2014/main" val="3402512241"/>
                     </a:ext>
                   </a:extLst>
                 </a:gridCol>
               </a:tblGrid>
-              <a:tr h="350971">
+              <a:tr h="190500">
                 <a:tc>
                   <a:txBody>
                     <a:bodyPr/>
@@ -16277,10 +16985,190 @@
                     <a:p>
                       <a:pPr algn="ctr" fontAlgn="t"/>
                       <a:r>
+                        <a:rPr lang="pl-PL" sz="1100" u="none" strike="noStrike" dirty="0" err="1">
+                          <a:effectLst/>
+                        </a:rPr>
+                        <a:t>Recall</a:t>
+                      </a:r>
+                      <a:endParaRPr lang="pl-PL" sz="1100" b="1" i="0" u="none" strike="noStrike" dirty="0">
+                        <a:solidFill>
+                          <a:srgbClr val="000000"/>
+                        </a:solidFill>
+                        <a:effectLst/>
+                        <a:latin typeface="Calibri" panose="020F0502020204030204" pitchFamily="34" charset="0"/>
+                      </a:endParaRPr>
+                    </a:p>
+                  </a:txBody>
+                  <a:tcPr marL="9525" marR="9525" marT="9525" marB="0" anchor="ctr">
+                    <a:lnL w="12700" cap="flat" cmpd="sng" algn="ctr">
+                      <a:solidFill>
+                        <a:schemeClr val="tx1"/>
+                      </a:solidFill>
+                      <a:prstDash val="solid"/>
+                      <a:round/>
+                      <a:headEnd type="none" w="med" len="med"/>
+                      <a:tailEnd type="none" w="med" len="med"/>
+                    </a:lnL>
+                    <a:lnR w="12700" cap="flat" cmpd="sng" algn="ctr">
+                      <a:solidFill>
+                        <a:schemeClr val="tx1"/>
+                      </a:solidFill>
+                      <a:prstDash val="solid"/>
+                      <a:round/>
+                      <a:headEnd type="none" w="med" len="med"/>
+                      <a:tailEnd type="none" w="med" len="med"/>
+                    </a:lnR>
+                    <a:lnT w="12700" cap="flat" cmpd="sng" algn="ctr">
+                      <a:solidFill>
+                        <a:schemeClr val="tx1"/>
+                      </a:solidFill>
+                      <a:prstDash val="solid"/>
+                      <a:round/>
+                      <a:headEnd type="none" w="med" len="med"/>
+                      <a:tailEnd type="none" w="med" len="med"/>
+                    </a:lnT>
+                    <a:lnB w="12700" cap="flat" cmpd="sng" algn="ctr">
+                      <a:solidFill>
+                        <a:schemeClr val="tx1"/>
+                      </a:solidFill>
+                      <a:prstDash val="solid"/>
+                      <a:round/>
+                      <a:headEnd type="none" w="med" len="med"/>
+                      <a:tailEnd type="none" w="med" len="med"/>
+                    </a:lnB>
+                  </a:tcPr>
+                </a:tc>
+                <a:tc>
+                  <a:txBody>
+                    <a:bodyPr/>
+                    <a:lstStyle/>
+                    <a:p>
+                      <a:pPr algn="ctr" fontAlgn="t"/>
+                      <a:r>
                         <a:rPr lang="pl-PL" sz="1100" u="none" strike="noStrike">
                           <a:effectLst/>
                         </a:rPr>
-                        <a:t>Recall</a:t>
+                        <a:t>Precision</a:t>
+                      </a:r>
+                      <a:endParaRPr lang="pl-PL" sz="1100" b="1" i="0" u="none" strike="noStrike">
+                        <a:solidFill>
+                          <a:srgbClr val="000000"/>
+                        </a:solidFill>
+                        <a:effectLst/>
+                        <a:latin typeface="Calibri" panose="020F0502020204030204" pitchFamily="34" charset="0"/>
+                      </a:endParaRPr>
+                    </a:p>
+                  </a:txBody>
+                  <a:tcPr marL="9525" marR="9525" marT="9525" marB="0" anchor="ctr">
+                    <a:lnL w="12700" cap="flat" cmpd="sng" algn="ctr">
+                      <a:solidFill>
+                        <a:schemeClr val="tx1"/>
+                      </a:solidFill>
+                      <a:prstDash val="solid"/>
+                      <a:round/>
+                      <a:headEnd type="none" w="med" len="med"/>
+                      <a:tailEnd type="none" w="med" len="med"/>
+                    </a:lnL>
+                    <a:lnR w="12700" cap="flat" cmpd="sng" algn="ctr">
+                      <a:solidFill>
+                        <a:schemeClr val="tx1"/>
+                      </a:solidFill>
+                      <a:prstDash val="solid"/>
+                      <a:round/>
+                      <a:headEnd type="none" w="med" len="med"/>
+                      <a:tailEnd type="none" w="med" len="med"/>
+                    </a:lnR>
+                    <a:lnT w="12700" cap="flat" cmpd="sng" algn="ctr">
+                      <a:solidFill>
+                        <a:schemeClr val="tx1"/>
+                      </a:solidFill>
+                      <a:prstDash val="solid"/>
+                      <a:round/>
+                      <a:headEnd type="none" w="med" len="med"/>
+                      <a:tailEnd type="none" w="med" len="med"/>
+                    </a:lnT>
+                    <a:lnB w="12700" cap="flat" cmpd="sng" algn="ctr">
+                      <a:solidFill>
+                        <a:schemeClr val="tx1"/>
+                      </a:solidFill>
+                      <a:prstDash val="solid"/>
+                      <a:round/>
+                      <a:headEnd type="none" w="med" len="med"/>
+                      <a:tailEnd type="none" w="med" len="med"/>
+                    </a:lnB>
+                  </a:tcPr>
+                </a:tc>
+                <a:tc>
+                  <a:txBody>
+                    <a:bodyPr/>
+                    <a:lstStyle/>
+                    <a:p>
+                      <a:pPr algn="ctr" fontAlgn="t"/>
+                      <a:r>
+                        <a:rPr lang="pl-PL" sz="1100" u="none" strike="noStrike">
+                          <a:effectLst/>
+                        </a:rPr>
+                        <a:t>F1</a:t>
+                      </a:r>
+                      <a:endParaRPr lang="pl-PL" sz="1100" b="1" i="0" u="none" strike="noStrike">
+                        <a:solidFill>
+                          <a:srgbClr val="000000"/>
+                        </a:solidFill>
+                        <a:effectLst/>
+                        <a:latin typeface="Calibri" panose="020F0502020204030204" pitchFamily="34" charset="0"/>
+                      </a:endParaRPr>
+                    </a:p>
+                  </a:txBody>
+                  <a:tcPr marL="9525" marR="9525" marT="9525" marB="0" anchor="ctr">
+                    <a:lnL w="12700" cap="flat" cmpd="sng" algn="ctr">
+                      <a:solidFill>
+                        <a:schemeClr val="tx1"/>
+                      </a:solidFill>
+                      <a:prstDash val="solid"/>
+                      <a:round/>
+                      <a:headEnd type="none" w="med" len="med"/>
+                      <a:tailEnd type="none" w="med" len="med"/>
+                    </a:lnL>
+                    <a:lnR w="12700" cap="flat" cmpd="sng" algn="ctr">
+                      <a:solidFill>
+                        <a:schemeClr val="tx1"/>
+                      </a:solidFill>
+                      <a:prstDash val="solid"/>
+                      <a:round/>
+                      <a:headEnd type="none" w="med" len="med"/>
+                      <a:tailEnd type="none" w="med" len="med"/>
+                    </a:lnR>
+                    <a:lnT w="12700" cap="flat" cmpd="sng" algn="ctr">
+                      <a:solidFill>
+                        <a:schemeClr val="tx1"/>
+                      </a:solidFill>
+                      <a:prstDash val="solid"/>
+                      <a:round/>
+                      <a:headEnd type="none" w="med" len="med"/>
+                      <a:tailEnd type="none" w="med" len="med"/>
+                    </a:lnT>
+                    <a:lnB w="12700" cap="flat" cmpd="sng" algn="ctr">
+                      <a:solidFill>
+                        <a:schemeClr val="tx1"/>
+                      </a:solidFill>
+                      <a:prstDash val="solid"/>
+                      <a:round/>
+                      <a:headEnd type="none" w="med" len="med"/>
+                      <a:tailEnd type="none" w="med" len="med"/>
+                    </a:lnB>
+                  </a:tcPr>
+                </a:tc>
+                <a:tc>
+                  <a:txBody>
+                    <a:bodyPr/>
+                    <a:lstStyle/>
+                    <a:p>
+                      <a:pPr algn="ctr" fontAlgn="t"/>
+                      <a:r>
+                        <a:rPr lang="pl-PL" sz="1100" u="none" strike="noStrike">
+                          <a:effectLst/>
+                        </a:rPr>
+                        <a:t>Accuracy</a:t>
                       </a:r>
                       <a:endParaRPr lang="pl-PL" sz="1100" b="1" i="0" u="none" strike="noStrike">
                         <a:solidFill>
@@ -16340,127 +17228,7 @@
                         <a:rPr lang="pl-PL" sz="1100" u="none" strike="noStrike" dirty="0">
                           <a:effectLst/>
                         </a:rPr>
-                        <a:t>Precision</a:t>
-                      </a:r>
-                      <a:endParaRPr lang="pl-PL" sz="1100" b="1" i="0" u="none" strike="noStrike" dirty="0">
-                        <a:solidFill>
-                          <a:srgbClr val="000000"/>
-                        </a:solidFill>
-                        <a:effectLst/>
-                        <a:latin typeface="Calibri" panose="020F0502020204030204" pitchFamily="34" charset="0"/>
-                      </a:endParaRPr>
-                    </a:p>
-                  </a:txBody>
-                  <a:tcPr marL="9525" marR="9525" marT="9525" marB="0" anchor="ctr">
-                    <a:lnL w="12700" cap="flat" cmpd="sng" algn="ctr">
-                      <a:solidFill>
-                        <a:schemeClr val="tx1"/>
-                      </a:solidFill>
-                      <a:prstDash val="solid"/>
-                      <a:round/>
-                      <a:headEnd type="none" w="med" len="med"/>
-                      <a:tailEnd type="none" w="med" len="med"/>
-                    </a:lnL>
-                    <a:lnR w="12700" cap="flat" cmpd="sng" algn="ctr">
-                      <a:solidFill>
-                        <a:schemeClr val="tx1"/>
-                      </a:solidFill>
-                      <a:prstDash val="solid"/>
-                      <a:round/>
-                      <a:headEnd type="none" w="med" len="med"/>
-                      <a:tailEnd type="none" w="med" len="med"/>
-                    </a:lnR>
-                    <a:lnT w="12700" cap="flat" cmpd="sng" algn="ctr">
-                      <a:solidFill>
-                        <a:schemeClr val="tx1"/>
-                      </a:solidFill>
-                      <a:prstDash val="solid"/>
-                      <a:round/>
-                      <a:headEnd type="none" w="med" len="med"/>
-                      <a:tailEnd type="none" w="med" len="med"/>
-                    </a:lnT>
-                    <a:lnB w="12700" cap="flat" cmpd="sng" algn="ctr">
-                      <a:solidFill>
-                        <a:schemeClr val="tx1"/>
-                      </a:solidFill>
-                      <a:prstDash val="solid"/>
-                      <a:round/>
-                      <a:headEnd type="none" w="med" len="med"/>
-                      <a:tailEnd type="none" w="med" len="med"/>
-                    </a:lnB>
-                  </a:tcPr>
-                </a:tc>
-                <a:tc>
-                  <a:txBody>
-                    <a:bodyPr/>
-                    <a:lstStyle/>
-                    <a:p>
-                      <a:pPr algn="ctr" fontAlgn="t"/>
-                      <a:r>
-                        <a:rPr lang="pl-PL" sz="1100" u="none" strike="noStrike" dirty="0">
-                          <a:effectLst/>
-                        </a:rPr>
-                        <a:t>F1</a:t>
-                      </a:r>
-                      <a:endParaRPr lang="pl-PL" sz="1100" b="1" i="0" u="none" strike="noStrike" dirty="0">
-                        <a:solidFill>
-                          <a:srgbClr val="000000"/>
-                        </a:solidFill>
-                        <a:effectLst/>
-                        <a:latin typeface="Calibri" panose="020F0502020204030204" pitchFamily="34" charset="0"/>
-                      </a:endParaRPr>
-                    </a:p>
-                  </a:txBody>
-                  <a:tcPr marL="9525" marR="9525" marT="9525" marB="0" anchor="ctr">
-                    <a:lnL w="12700" cap="flat" cmpd="sng" algn="ctr">
-                      <a:solidFill>
-                        <a:schemeClr val="tx1"/>
-                      </a:solidFill>
-                      <a:prstDash val="solid"/>
-                      <a:round/>
-                      <a:headEnd type="none" w="med" len="med"/>
-                      <a:tailEnd type="none" w="med" len="med"/>
-                    </a:lnL>
-                    <a:lnR w="12700" cap="flat" cmpd="sng" algn="ctr">
-                      <a:solidFill>
-                        <a:schemeClr val="tx1"/>
-                      </a:solidFill>
-                      <a:prstDash val="solid"/>
-                      <a:round/>
-                      <a:headEnd type="none" w="med" len="med"/>
-                      <a:tailEnd type="none" w="med" len="med"/>
-                    </a:lnR>
-                    <a:lnT w="12700" cap="flat" cmpd="sng" algn="ctr">
-                      <a:solidFill>
-                        <a:schemeClr val="tx1"/>
-                      </a:solidFill>
-                      <a:prstDash val="solid"/>
-                      <a:round/>
-                      <a:headEnd type="none" w="med" len="med"/>
-                      <a:tailEnd type="none" w="med" len="med"/>
-                    </a:lnT>
-                    <a:lnB w="12700" cap="flat" cmpd="sng" algn="ctr">
-                      <a:solidFill>
-                        <a:schemeClr val="tx1"/>
-                      </a:solidFill>
-                      <a:prstDash val="solid"/>
-                      <a:round/>
-                      <a:headEnd type="none" w="med" len="med"/>
-                      <a:tailEnd type="none" w="med" len="med"/>
-                    </a:lnB>
-                  </a:tcPr>
-                </a:tc>
-                <a:tc>
-                  <a:txBody>
-                    <a:bodyPr/>
-                    <a:lstStyle/>
-                    <a:p>
-                      <a:pPr algn="ctr" fontAlgn="t"/>
-                      <a:r>
-                        <a:rPr lang="pl-PL" sz="1100" u="none" strike="noStrike" dirty="0" err="1">
-                          <a:effectLst/>
-                        </a:rPr>
-                        <a:t>Accuracy</a:t>
+                        <a:t>KS</a:t>
                       </a:r>
                       <a:endParaRPr lang="pl-PL" sz="1100" b="1" i="0" u="none" strike="noStrike" dirty="0">
                         <a:solidFill>
@@ -16520,69 +17288,9 @@
                         <a:rPr lang="pl-PL" sz="1100" u="none" strike="noStrike">
                           <a:effectLst/>
                         </a:rPr>
-                        <a:t>KS</a:t>
+                        <a:t>ROC_AUC</a:t>
                       </a:r>
                       <a:endParaRPr lang="pl-PL" sz="1100" b="1" i="0" u="none" strike="noStrike">
-                        <a:solidFill>
-                          <a:srgbClr val="000000"/>
-                        </a:solidFill>
-                        <a:effectLst/>
-                        <a:latin typeface="Calibri" panose="020F0502020204030204" pitchFamily="34" charset="0"/>
-                      </a:endParaRPr>
-                    </a:p>
-                  </a:txBody>
-                  <a:tcPr marL="9525" marR="9525" marT="9525" marB="0" anchor="ctr">
-                    <a:lnL w="12700" cap="flat" cmpd="sng" algn="ctr">
-                      <a:solidFill>
-                        <a:schemeClr val="tx1"/>
-                      </a:solidFill>
-                      <a:prstDash val="solid"/>
-                      <a:round/>
-                      <a:headEnd type="none" w="med" len="med"/>
-                      <a:tailEnd type="none" w="med" len="med"/>
-                    </a:lnL>
-                    <a:lnR w="12700" cap="flat" cmpd="sng" algn="ctr">
-                      <a:solidFill>
-                        <a:schemeClr val="tx1"/>
-                      </a:solidFill>
-                      <a:prstDash val="solid"/>
-                      <a:round/>
-                      <a:headEnd type="none" w="med" len="med"/>
-                      <a:tailEnd type="none" w="med" len="med"/>
-                    </a:lnR>
-                    <a:lnT w="12700" cap="flat" cmpd="sng" algn="ctr">
-                      <a:solidFill>
-                        <a:schemeClr val="tx1"/>
-                      </a:solidFill>
-                      <a:prstDash val="solid"/>
-                      <a:round/>
-                      <a:headEnd type="none" w="med" len="med"/>
-                      <a:tailEnd type="none" w="med" len="med"/>
-                    </a:lnT>
-                    <a:lnB w="12700" cap="flat" cmpd="sng" algn="ctr">
-                      <a:solidFill>
-                        <a:schemeClr val="tx1"/>
-                      </a:solidFill>
-                      <a:prstDash val="solid"/>
-                      <a:round/>
-                      <a:headEnd type="none" w="med" len="med"/>
-                      <a:tailEnd type="none" w="med" len="med"/>
-                    </a:lnB>
-                  </a:tcPr>
-                </a:tc>
-                <a:tc>
-                  <a:txBody>
-                    <a:bodyPr/>
-                    <a:lstStyle/>
-                    <a:p>
-                      <a:pPr algn="ctr" fontAlgn="t"/>
-                      <a:r>
-                        <a:rPr lang="pl-PL" sz="1100" u="none" strike="noStrike" dirty="0">
-                          <a:effectLst/>
-                        </a:rPr>
-                        <a:t>ROC_AUC</a:t>
-                      </a:r>
-                      <a:endParaRPr lang="pl-PL" sz="1100" b="1" i="0" u="none" strike="noStrike" dirty="0">
                         <a:solidFill>
                           <a:srgbClr val="000000"/>
                         </a:solidFill>
@@ -16757,12 +17465,12 @@
                     <a:p>
                       <a:pPr algn="ctr" fontAlgn="t"/>
                       <a:r>
-                        <a:rPr lang="pl-PL" sz="1100" u="none" strike="noStrike" dirty="0" err="1">
+                        <a:rPr lang="pl-PL" sz="1100" u="none" strike="noStrike">
                           <a:effectLst/>
                         </a:rPr>
                         <a:t>Acc_diff</a:t>
                       </a:r>
-                      <a:endParaRPr lang="pl-PL" sz="1100" b="1" i="0" u="none" strike="noStrike" dirty="0">
+                      <a:endParaRPr lang="pl-PL" sz="1100" b="1" i="0" u="none" strike="noStrike">
                         <a:solidFill>
                           <a:srgbClr val="000000"/>
                         </a:solidFill>
@@ -16877,24 +17585,12 @@
                     <a:p>
                       <a:pPr algn="ctr" fontAlgn="t"/>
                       <a:r>
-                        <a:rPr lang="pl-PL" sz="1100" u="none" strike="noStrike" dirty="0" err="1">
+                        <a:rPr lang="pl-PL" sz="1100" u="none" strike="noStrike">
                           <a:effectLst/>
                         </a:rPr>
-                        <a:t>Fal_neg</a:t>
+                        <a:t>Fal_neg_rate</a:t>
                       </a:r>
-                      <a:r>
-                        <a:rPr lang="pl-PL" sz="1100" u="none" strike="noStrike" dirty="0">
-                          <a:effectLst/>
-                        </a:rPr>
-                        <a:t>/</a:t>
-                      </a:r>
-                      <a:r>
-                        <a:rPr lang="pl-PL" sz="1100" u="none" strike="noStrike" dirty="0" err="1">
-                          <a:effectLst/>
-                        </a:rPr>
-                        <a:t>all</a:t>
-                      </a:r>
-                      <a:endParaRPr lang="pl-PL" sz="1100" b="1" i="0" u="none" strike="noStrike" dirty="0">
+                      <a:endParaRPr lang="pl-PL" sz="1100" b="1" i="0" u="none" strike="noStrike">
                         <a:solidFill>
                           <a:srgbClr val="000000"/>
                         </a:solidFill>
@@ -16949,24 +17645,12 @@
                     <a:p>
                       <a:pPr algn="ctr" fontAlgn="t"/>
                       <a:r>
-                        <a:rPr lang="pl-PL" sz="1100" u="none" strike="noStrike" dirty="0" err="1">
+                        <a:rPr lang="pl-PL" sz="1100" u="none" strike="noStrike">
                           <a:effectLst/>
                         </a:rPr>
-                        <a:t>True_positive</a:t>
+                        <a:t>True_positive_rate</a:t>
                       </a:r>
-                      <a:r>
-                        <a:rPr lang="pl-PL" sz="1100" u="none" strike="noStrike" dirty="0">
-                          <a:effectLst/>
-                        </a:rPr>
-                        <a:t>/</a:t>
-                      </a:r>
-                      <a:r>
-                        <a:rPr lang="pl-PL" sz="1100" u="none" strike="noStrike" dirty="0" err="1">
-                          <a:effectLst/>
-                        </a:rPr>
-                        <a:t>all</a:t>
-                      </a:r>
-                      <a:endParaRPr lang="pl-PL" sz="1100" b="1" i="0" u="none" strike="noStrike" dirty="0">
+                      <a:endParaRPr lang="pl-PL" sz="1100" b="1" i="0" u="none" strike="noStrike">
                         <a:solidFill>
                           <a:srgbClr val="000000"/>
                         </a:solidFill>
@@ -17016,11 +17700,91 @@
                 </a:tc>
                 <a:extLst>
                   <a:ext uri="{0D108BD9-81ED-4DB2-BD59-A6C34878D82A}">
-                    <a16:rowId xmlns:a16="http://schemas.microsoft.com/office/drawing/2014/main" val="1481642066"/>
+                    <a16:rowId xmlns:a16="http://schemas.microsoft.com/office/drawing/2014/main" val="890100815"/>
                   </a:ext>
                 </a:extLst>
               </a:tr>
-              <a:tr h="321311">
+              <a:tr h="190500">
+                <a:tc>
+                  <a:txBody>
+                    <a:bodyPr/>
+                    <a:lstStyle/>
+                    <a:p>
+                      <a:pPr algn="ctr" fontAlgn="b"/>
+                      <a:r>
+                        <a:rPr lang="pl-PL" sz="1100" u="none" strike="noStrike" dirty="0">
+                          <a:effectLst/>
+                        </a:rPr>
+                        <a:t>XGB  (</a:t>
+                      </a:r>
+                      <a:r>
+                        <a:rPr lang="pl-PL" sz="1100" u="none" strike="noStrike" dirty="0" err="1">
+                          <a:effectLst/>
+                        </a:rPr>
+                        <a:t>undersample</a:t>
+                      </a:r>
+                      <a:r>
+                        <a:rPr lang="pl-PL" sz="1100" u="none" strike="noStrike" dirty="0">
+                          <a:effectLst/>
+                        </a:rPr>
+                        <a:t>)</a:t>
+                      </a:r>
+                      <a:endParaRPr lang="pl-PL" sz="1100" b="0" i="0" u="none" strike="noStrike" dirty="0">
+                        <a:solidFill>
+                          <a:srgbClr val="000000"/>
+                        </a:solidFill>
+                        <a:effectLst/>
+                        <a:latin typeface="Calibri" panose="020F0502020204030204" pitchFamily="34" charset="0"/>
+                      </a:endParaRPr>
+                    </a:p>
+                  </a:txBody>
+                  <a:tcPr marL="9525" marR="9525" marT="9525" marB="0" anchor="ctr">
+                    <a:lnL w="12700" cap="flat" cmpd="sng" algn="ctr">
+                      <a:solidFill>
+                        <a:schemeClr val="tx1"/>
+                      </a:solidFill>
+                      <a:prstDash val="solid"/>
+                      <a:round/>
+                      <a:headEnd type="none" w="med" len="med"/>
+                      <a:tailEnd type="none" w="med" len="med"/>
+                    </a:lnL>
+                    <a:lnR w="12700" cap="flat" cmpd="sng" algn="ctr">
+                      <a:solidFill>
+                        <a:schemeClr val="tx1"/>
+                      </a:solidFill>
+                      <a:prstDash val="solid"/>
+                      <a:round/>
+                      <a:headEnd type="none" w="med" len="med"/>
+                      <a:tailEnd type="none" w="med" len="med"/>
+                    </a:lnR>
+                    <a:lnT w="12700" cap="flat" cmpd="sng" algn="ctr">
+                      <a:solidFill>
+                        <a:schemeClr val="tx1"/>
+                      </a:solidFill>
+                      <a:prstDash val="solid"/>
+                      <a:round/>
+                      <a:headEnd type="none" w="med" len="med"/>
+                      <a:tailEnd type="none" w="med" len="med"/>
+                    </a:lnT>
+                    <a:lnB w="12700" cap="flat" cmpd="sng" algn="ctr">
+                      <a:solidFill>
+                        <a:schemeClr val="tx1"/>
+                      </a:solidFill>
+                      <a:prstDash val="solid"/>
+                      <a:round/>
+                      <a:headEnd type="none" w="med" len="med"/>
+                      <a:tailEnd type="none" w="med" len="med"/>
+                    </a:lnB>
+                    <a:lnTlToBr w="12700" cmpd="sng">
+                      <a:noFill/>
+                      <a:prstDash val="solid"/>
+                    </a:lnTlToBr>
+                    <a:lnBlToTr w="12700" cmpd="sng">
+                      <a:noFill/>
+                      <a:prstDash val="solid"/>
+                    </a:lnBlToTr>
+                  </a:tcPr>
+                </a:tc>
                 <a:tc>
                   <a:txBody>
                     <a:bodyPr/>
@@ -17031,69 +17795,9 @@
                         <a:rPr lang="pl-PL" sz="1100" u="none" strike="noStrike">
                           <a:effectLst/>
                         </a:rPr>
-                        <a:t>XGB (undersample)</a:t>
+                        <a:t>0,984721538</a:t>
                       </a:r>
                       <a:endParaRPr lang="pl-PL" sz="1100" b="0" i="0" u="none" strike="noStrike">
-                        <a:solidFill>
-                          <a:srgbClr val="000000"/>
-                        </a:solidFill>
-                        <a:effectLst/>
-                        <a:latin typeface="Calibri" panose="020F0502020204030204" pitchFamily="34" charset="0"/>
-                      </a:endParaRPr>
-                    </a:p>
-                  </a:txBody>
-                  <a:tcPr marL="9525" marR="9525" marT="9525" marB="0" anchor="ctr">
-                    <a:lnL w="12700" cap="flat" cmpd="sng" algn="ctr">
-                      <a:solidFill>
-                        <a:schemeClr val="tx1"/>
-                      </a:solidFill>
-                      <a:prstDash val="solid"/>
-                      <a:round/>
-                      <a:headEnd type="none" w="med" len="med"/>
-                      <a:tailEnd type="none" w="med" len="med"/>
-                    </a:lnL>
-                    <a:lnR w="12700" cap="flat" cmpd="sng" algn="ctr">
-                      <a:solidFill>
-                        <a:schemeClr val="tx1"/>
-                      </a:solidFill>
-                      <a:prstDash val="solid"/>
-                      <a:round/>
-                      <a:headEnd type="none" w="med" len="med"/>
-                      <a:tailEnd type="none" w="med" len="med"/>
-                    </a:lnR>
-                    <a:lnT w="12700" cap="flat" cmpd="sng" algn="ctr">
-                      <a:solidFill>
-                        <a:schemeClr val="tx1"/>
-                      </a:solidFill>
-                      <a:prstDash val="solid"/>
-                      <a:round/>
-                      <a:headEnd type="none" w="med" len="med"/>
-                      <a:tailEnd type="none" w="med" len="med"/>
-                    </a:lnT>
-                    <a:lnB w="12700" cap="flat" cmpd="sng" algn="ctr">
-                      <a:solidFill>
-                        <a:schemeClr val="tx1"/>
-                      </a:solidFill>
-                      <a:prstDash val="solid"/>
-                      <a:round/>
-                      <a:headEnd type="none" w="med" len="med"/>
-                      <a:tailEnd type="none" w="med" len="med"/>
-                    </a:lnB>
-                  </a:tcPr>
-                </a:tc>
-                <a:tc>
-                  <a:txBody>
-                    <a:bodyPr/>
-                    <a:lstStyle/>
-                    <a:p>
-                      <a:pPr algn="ctr" fontAlgn="b"/>
-                      <a:r>
-                        <a:rPr lang="pl-PL" sz="1100" u="none" strike="noStrike" dirty="0">
-                          <a:effectLst/>
-                        </a:rPr>
-                        <a:t>0,984722</a:t>
-                      </a:r>
-                      <a:endParaRPr lang="pl-PL" sz="1100" b="0" i="0" u="none" strike="noStrike" dirty="0">
                         <a:solidFill>
                           <a:srgbClr val="000000"/>
                         </a:solidFill>
@@ -17208,12 +17912,12 @@
                     <a:p>
                       <a:pPr algn="ctr" fontAlgn="b"/>
                       <a:r>
-                        <a:rPr lang="pl-PL" sz="1100" u="none" strike="noStrike">
+                        <a:rPr lang="pl-PL" sz="1100" u="none" strike="noStrike" dirty="0">
                           <a:effectLst/>
                         </a:rPr>
                         <a:t>0,11781</a:t>
                       </a:r>
-                      <a:endParaRPr lang="pl-PL" sz="1100" b="0" i="0" u="none" strike="noStrike">
+                      <a:endParaRPr lang="pl-PL" sz="1100" b="0" i="0" u="none" strike="noStrike" dirty="0">
                         <a:solidFill>
                           <a:srgbClr val="000000"/>
                         </a:solidFill>
@@ -17691,7 +18395,7 @@
                         <a:rPr lang="pl-PL" sz="1100" u="none" strike="noStrike">
                           <a:effectLst/>
                         </a:rPr>
-                        <a:t>0,000709</a:t>
+                        <a:t>0,015278</a:t>
                       </a:r>
                       <a:endParaRPr lang="pl-PL" sz="1100" b="0" i="0" u="none" strike="noStrike">
                         <a:solidFill>
@@ -17803,11 +18507,11 @@
                 </a:tc>
                 <a:extLst>
                   <a:ext uri="{0D108BD9-81ED-4DB2-BD59-A6C34878D82A}">
-                    <a16:rowId xmlns:a16="http://schemas.microsoft.com/office/drawing/2014/main" val="1923189239"/>
+                    <a16:rowId xmlns:a16="http://schemas.microsoft.com/office/drawing/2014/main" val="1022186902"/>
                   </a:ext>
                 </a:extLst>
               </a:tr>
-              <a:tr h="321311">
+              <a:tr h="190500">
                 <a:tc>
                   <a:txBody>
                     <a:bodyPr/>
@@ -17878,7 +18582,67 @@
                         <a:rPr lang="pl-PL" sz="1100" u="none" strike="noStrike">
                           <a:effectLst/>
                         </a:rPr>
-                        <a:t>0,9517</a:t>
+                        <a:t>0,951700345</a:t>
+                      </a:r>
+                      <a:endParaRPr lang="pl-PL" sz="1100" b="0" i="0" u="none" strike="noStrike">
+                        <a:solidFill>
+                          <a:srgbClr val="000000"/>
+                        </a:solidFill>
+                        <a:effectLst/>
+                        <a:latin typeface="Calibri" panose="020F0502020204030204" pitchFamily="34" charset="0"/>
+                      </a:endParaRPr>
+                    </a:p>
+                  </a:txBody>
+                  <a:tcPr marL="9525" marR="9525" marT="9525" marB="0" anchor="ctr">
+                    <a:lnL w="12700" cap="flat" cmpd="sng" algn="ctr">
+                      <a:solidFill>
+                        <a:schemeClr val="tx1"/>
+                      </a:solidFill>
+                      <a:prstDash val="solid"/>
+                      <a:round/>
+                      <a:headEnd type="none" w="med" len="med"/>
+                      <a:tailEnd type="none" w="med" len="med"/>
+                    </a:lnL>
+                    <a:lnR w="12700" cap="flat" cmpd="sng" algn="ctr">
+                      <a:solidFill>
+                        <a:schemeClr val="tx1"/>
+                      </a:solidFill>
+                      <a:prstDash val="solid"/>
+                      <a:round/>
+                      <a:headEnd type="none" w="med" len="med"/>
+                      <a:tailEnd type="none" w="med" len="med"/>
+                    </a:lnR>
+                    <a:lnT w="12700" cap="flat" cmpd="sng" algn="ctr">
+                      <a:solidFill>
+                        <a:schemeClr val="tx1"/>
+                      </a:solidFill>
+                      <a:prstDash val="solid"/>
+                      <a:round/>
+                      <a:headEnd type="none" w="med" len="med"/>
+                      <a:tailEnd type="none" w="med" len="med"/>
+                    </a:lnT>
+                    <a:lnB w="12700" cap="flat" cmpd="sng" algn="ctr">
+                      <a:solidFill>
+                        <a:schemeClr val="tx1"/>
+                      </a:solidFill>
+                      <a:prstDash val="solid"/>
+                      <a:round/>
+                      <a:headEnd type="none" w="med" len="med"/>
+                      <a:tailEnd type="none" w="med" len="med"/>
+                    </a:lnB>
+                  </a:tcPr>
+                </a:tc>
+                <a:tc>
+                  <a:txBody>
+                    <a:bodyPr/>
+                    <a:lstStyle/>
+                    <a:p>
+                      <a:pPr algn="ctr" fontAlgn="b"/>
+                      <a:r>
+                        <a:rPr lang="pl-PL" sz="1100" u="none" strike="noStrike">
+                          <a:effectLst/>
+                        </a:rPr>
+                        <a:t>0,358989</a:t>
                       </a:r>
                       <a:endParaRPr lang="pl-PL" sz="1100" b="0" i="0" u="none" strike="noStrike">
                         <a:solidFill>
@@ -17938,69 +18702,9 @@
                         <a:rPr lang="pl-PL" sz="1100" u="none" strike="noStrike" dirty="0">
                           <a:effectLst/>
                         </a:rPr>
-                        <a:t>0,358989</a:t>
+                        <a:t>0,52132</a:t>
                       </a:r>
                       <a:endParaRPr lang="pl-PL" sz="1100" b="0" i="0" u="none" strike="noStrike" dirty="0">
-                        <a:solidFill>
-                          <a:srgbClr val="000000"/>
-                        </a:solidFill>
-                        <a:effectLst/>
-                        <a:latin typeface="Calibri" panose="020F0502020204030204" pitchFamily="34" charset="0"/>
-                      </a:endParaRPr>
-                    </a:p>
-                  </a:txBody>
-                  <a:tcPr marL="9525" marR="9525" marT="9525" marB="0" anchor="ctr">
-                    <a:lnL w="12700" cap="flat" cmpd="sng" algn="ctr">
-                      <a:solidFill>
-                        <a:schemeClr val="tx1"/>
-                      </a:solidFill>
-                      <a:prstDash val="solid"/>
-                      <a:round/>
-                      <a:headEnd type="none" w="med" len="med"/>
-                      <a:tailEnd type="none" w="med" len="med"/>
-                    </a:lnL>
-                    <a:lnR w="12700" cap="flat" cmpd="sng" algn="ctr">
-                      <a:solidFill>
-                        <a:schemeClr val="tx1"/>
-                      </a:solidFill>
-                      <a:prstDash val="solid"/>
-                      <a:round/>
-                      <a:headEnd type="none" w="med" len="med"/>
-                      <a:tailEnd type="none" w="med" len="med"/>
-                    </a:lnR>
-                    <a:lnT w="12700" cap="flat" cmpd="sng" algn="ctr">
-                      <a:solidFill>
-                        <a:schemeClr val="tx1"/>
-                      </a:solidFill>
-                      <a:prstDash val="solid"/>
-                      <a:round/>
-                      <a:headEnd type="none" w="med" len="med"/>
-                      <a:tailEnd type="none" w="med" len="med"/>
-                    </a:lnT>
-                    <a:lnB w="12700" cap="flat" cmpd="sng" algn="ctr">
-                      <a:solidFill>
-                        <a:schemeClr val="tx1"/>
-                      </a:solidFill>
-                      <a:prstDash val="solid"/>
-                      <a:round/>
-                      <a:headEnd type="none" w="med" len="med"/>
-                      <a:tailEnd type="none" w="med" len="med"/>
-                    </a:lnB>
-                  </a:tcPr>
-                </a:tc>
-                <a:tc>
-                  <a:txBody>
-                    <a:bodyPr/>
-                    <a:lstStyle/>
-                    <a:p>
-                      <a:pPr algn="ctr" fontAlgn="b"/>
-                      <a:r>
-                        <a:rPr lang="pl-PL" sz="1100" u="none" strike="noStrike">
-                          <a:effectLst/>
-                        </a:rPr>
-                        <a:t>0,521328</a:t>
-                      </a:r>
-                      <a:endParaRPr lang="pl-PL" sz="1100" b="0" i="0" u="none" strike="noStrike">
                         <a:solidFill>
                           <a:srgbClr val="000000"/>
                         </a:solidFill>
@@ -18478,7 +19182,7 @@
                         <a:rPr lang="pl-PL" sz="1100" u="none" strike="noStrike">
                           <a:effectLst/>
                         </a:rPr>
-                        <a:t>0,002242</a:t>
+                        <a:t>0,0483</a:t>
                       </a:r>
                       <a:endParaRPr lang="pl-PL" sz="1100" b="0" i="0" u="none" strike="noStrike">
                         <a:solidFill>
@@ -18590,11 +19294,11 @@
                 </a:tc>
                 <a:extLst>
                   <a:ext uri="{0D108BD9-81ED-4DB2-BD59-A6C34878D82A}">
-                    <a16:rowId xmlns:a16="http://schemas.microsoft.com/office/drawing/2014/main" val="1629715765"/>
+                    <a16:rowId xmlns:a16="http://schemas.microsoft.com/office/drawing/2014/main" val="2383395271"/>
                   </a:ext>
                 </a:extLst>
               </a:tr>
-              <a:tr h="321311">
+              <a:tr h="190500">
                 <a:tc>
                   <a:txBody>
                     <a:bodyPr/>
@@ -18677,7 +19381,7 @@
                         <a:rPr lang="pl-PL" sz="1100" u="none" strike="noStrike">
                           <a:effectLst/>
                         </a:rPr>
-                        <a:t>0,950715</a:t>
+                        <a:t>0,950714638</a:t>
                       </a:r>
                       <a:endParaRPr lang="pl-PL" sz="1100" b="0" i="0" u="none" strike="noStrike">
                         <a:solidFill>
@@ -18797,7 +19501,7 @@
                         <a:rPr lang="pl-PL" sz="1100" u="none" strike="noStrike" dirty="0">
                           <a:effectLst/>
                         </a:rPr>
-                        <a:t>0,4301</a:t>
+                        <a:t>0,43010</a:t>
                       </a:r>
                       <a:endParaRPr lang="pl-PL" sz="1100" b="0" i="0" u="none" strike="noStrike" dirty="0">
                         <a:solidFill>
@@ -19277,7 +19981,7 @@
                         <a:rPr lang="pl-PL" sz="1100" u="none" strike="noStrike">
                           <a:effectLst/>
                         </a:rPr>
-                        <a:t>0,002288</a:t>
+                        <a:t>0,049285</a:t>
                       </a:r>
                       <a:endParaRPr lang="pl-PL" sz="1100" b="0" i="0" u="none" strike="noStrike">
                         <a:solidFill>
@@ -19389,11 +20093,11 @@
                 </a:tc>
                 <a:extLst>
                   <a:ext uri="{0D108BD9-81ED-4DB2-BD59-A6C34878D82A}">
-                    <a16:rowId xmlns:a16="http://schemas.microsoft.com/office/drawing/2014/main" val="4051933187"/>
+                    <a16:rowId xmlns:a16="http://schemas.microsoft.com/office/drawing/2014/main" val="3051643080"/>
                   </a:ext>
                 </a:extLst>
               </a:tr>
-              <a:tr h="321311">
+              <a:tr h="190500">
                 <a:tc>
                   <a:txBody>
                     <a:bodyPr/>
@@ -19464,7 +20168,7 @@
                         <a:rPr lang="pl-PL" sz="1100" u="none" strike="noStrike">
                           <a:effectLst/>
                         </a:rPr>
-                        <a:t>0,890586</a:t>
+                        <a:t>0,890586496</a:t>
                       </a:r>
                       <a:endParaRPr lang="pl-PL" sz="1100" b="0" i="0" u="none" strike="noStrike">
                         <a:solidFill>
@@ -19581,12 +20285,12 @@
                     <a:p>
                       <a:pPr algn="ctr" fontAlgn="b"/>
                       <a:r>
-                        <a:rPr lang="pl-PL" sz="1100" u="none" strike="noStrike">
+                        <a:rPr lang="pl-PL" sz="1100" u="none" strike="noStrike" dirty="0">
                           <a:effectLst/>
                         </a:rPr>
-                        <a:t>0,356974</a:t>
+                        <a:t>0,35697</a:t>
                       </a:r>
-                      <a:endParaRPr lang="pl-PL" sz="1100" b="0" i="0" u="none" strike="noStrike">
+                      <a:endParaRPr lang="pl-PL" sz="1100" b="0" i="0" u="none" strike="noStrike" dirty="0">
                         <a:solidFill>
                           <a:srgbClr val="000000"/>
                         </a:solidFill>
@@ -19641,12 +20345,12 @@
                     <a:p>
                       <a:pPr algn="ctr" fontAlgn="b"/>
                       <a:r>
-                        <a:rPr lang="pl-PL" sz="1100" u="none" strike="noStrike" dirty="0">
+                        <a:rPr lang="pl-PL" sz="1100" u="none" strike="noStrike">
                           <a:effectLst/>
                         </a:rPr>
                         <a:t>0,851064</a:t>
                       </a:r>
-                      <a:endParaRPr lang="pl-PL" sz="1100" b="0" i="0" u="none" strike="noStrike" dirty="0">
+                      <a:endParaRPr lang="pl-PL" sz="1100" b="0" i="0" u="none" strike="noStrike">
                         <a:solidFill>
                           <a:srgbClr val="000000"/>
                         </a:solidFill>
@@ -20064,7 +20768,7 @@
                         <a:rPr lang="pl-PL" sz="1100" u="none" strike="noStrike">
                           <a:effectLst/>
                         </a:rPr>
-                        <a:t>0,005079</a:t>
+                        <a:t>0,109414</a:t>
                       </a:r>
                       <a:endParaRPr lang="pl-PL" sz="1100" b="0" i="0" u="none" strike="noStrike">
                         <a:solidFill>
@@ -20176,11 +20880,11 @@
                 </a:tc>
                 <a:extLst>
                   <a:ext uri="{0D108BD9-81ED-4DB2-BD59-A6C34878D82A}">
-                    <a16:rowId xmlns:a16="http://schemas.microsoft.com/office/drawing/2014/main" val="1273649912"/>
+                    <a16:rowId xmlns:a16="http://schemas.microsoft.com/office/drawing/2014/main" val="4239236233"/>
                   </a:ext>
                 </a:extLst>
               </a:tr>
-              <a:tr h="321311">
+              <a:tr h="190500">
                 <a:tc>
                   <a:txBody>
                     <a:bodyPr/>
@@ -20188,12 +20892,24 @@
                     <a:p>
                       <a:pPr algn="ctr" fontAlgn="b"/>
                       <a:r>
-                        <a:rPr lang="pl-PL" sz="1100" u="none" strike="noStrike">
+                        <a:rPr lang="pl-PL" sz="1100" u="none" strike="noStrike" dirty="0">
                           <a:effectLst/>
                         </a:rPr>
-                        <a:t>LGB (undersample)</a:t>
+                        <a:t>LGB  (</a:t>
                       </a:r>
-                      <a:endParaRPr lang="pl-PL" sz="1100" b="0" i="0" u="none" strike="noStrike">
+                      <a:r>
+                        <a:rPr lang="pl-PL" sz="1100" u="none" strike="noStrike" dirty="0" err="1">
+                          <a:effectLst/>
+                        </a:rPr>
+                        <a:t>undersample</a:t>
+                      </a:r>
+                      <a:r>
+                        <a:rPr lang="pl-PL" sz="1100" u="none" strike="noStrike" dirty="0">
+                          <a:effectLst/>
+                        </a:rPr>
+                        <a:t>)</a:t>
+                      </a:r>
+                      <a:endParaRPr lang="pl-PL" sz="1100" b="0" i="0" u="none" strike="noStrike" dirty="0">
                         <a:solidFill>
                           <a:srgbClr val="000000"/>
                         </a:solidFill>
@@ -20251,7 +20967,7 @@
                         <a:rPr lang="pl-PL" sz="1100" u="none" strike="noStrike">
                           <a:effectLst/>
                         </a:rPr>
-                        <a:t>0,877772</a:t>
+                        <a:t>0,877772302</a:t>
                       </a:r>
                       <a:endParaRPr lang="pl-PL" sz="1100" b="0" i="0" u="none" strike="noStrike">
                         <a:solidFill>
@@ -20368,12 +21084,12 @@
                     <a:p>
                       <a:pPr algn="ctr" fontAlgn="b"/>
                       <a:r>
-                        <a:rPr lang="pl-PL" sz="1100" u="none" strike="noStrike">
+                        <a:rPr lang="pl-PL" sz="1100" u="none" strike="noStrike" dirty="0">
                           <a:effectLst/>
                         </a:rPr>
-                        <a:t>0,358567</a:t>
+                        <a:t>0,35856</a:t>
                       </a:r>
-                      <a:endParaRPr lang="pl-PL" sz="1100" b="0" i="0" u="none" strike="noStrike">
+                      <a:endParaRPr lang="pl-PL" sz="1100" b="0" i="0" u="none" strike="noStrike" dirty="0">
                         <a:solidFill>
                           <a:srgbClr val="000000"/>
                         </a:solidFill>
@@ -20488,12 +21204,12 @@
                     <a:p>
                       <a:pPr algn="ctr" fontAlgn="b"/>
                       <a:r>
-                        <a:rPr lang="pl-PL" sz="1100" u="none" strike="noStrike" dirty="0">
+                        <a:rPr lang="pl-PL" sz="1100" u="none" strike="noStrike">
                           <a:effectLst/>
                         </a:rPr>
                         <a:t>0,731777</a:t>
                       </a:r>
-                      <a:endParaRPr lang="pl-PL" sz="1100" b="0" i="0" u="none" strike="noStrike" dirty="0">
+                      <a:endParaRPr lang="pl-PL" sz="1100" b="0" i="0" u="none" strike="noStrike">
                         <a:solidFill>
                           <a:srgbClr val="000000"/>
                         </a:solidFill>
@@ -20851,7 +21567,7 @@
                         <a:rPr lang="pl-PL" sz="1100" u="none" strike="noStrike">
                           <a:effectLst/>
                         </a:rPr>
-                        <a:t>0,005674</a:t>
+                        <a:t>0,122228</a:t>
                       </a:r>
                       <a:endParaRPr lang="pl-PL" sz="1100" b="0" i="0" u="none" strike="noStrike">
                         <a:solidFill>
@@ -20908,12 +21624,12 @@
                     <a:p>
                       <a:pPr algn="ctr" fontAlgn="b"/>
                       <a:r>
-                        <a:rPr lang="pl-PL" sz="1100" u="none" strike="noStrike" dirty="0">
+                        <a:rPr lang="pl-PL" sz="1100" u="none" strike="noStrike">
                           <a:effectLst/>
                         </a:rPr>
                         <a:t>0,040746</a:t>
                       </a:r>
-                      <a:endParaRPr lang="pl-PL" sz="1100" b="0" i="0" u="none" strike="noStrike" dirty="0">
+                      <a:endParaRPr lang="pl-PL" sz="1100" b="0" i="0" u="none" strike="noStrike">
                         <a:solidFill>
                           <a:srgbClr val="000000"/>
                         </a:solidFill>
@@ -20963,11 +21679,11 @@
                 </a:tc>
                 <a:extLst>
                   <a:ext uri="{0D108BD9-81ED-4DB2-BD59-A6C34878D82A}">
-                    <a16:rowId xmlns:a16="http://schemas.microsoft.com/office/drawing/2014/main" val="4037247675"/>
+                    <a16:rowId xmlns:a16="http://schemas.microsoft.com/office/drawing/2014/main" val="3041884760"/>
                   </a:ext>
                 </a:extLst>
               </a:tr>
-              <a:tr h="321311">
+              <a:tr h="190500">
                 <a:tc>
                   <a:txBody>
                     <a:bodyPr/>
@@ -21035,10 +21751,70 @@
                     <a:p>
                       <a:pPr algn="ctr" fontAlgn="b"/>
                       <a:r>
+                        <a:rPr lang="pl-PL" sz="1100" u="none" strike="noStrike">
+                          <a:effectLst/>
+                        </a:rPr>
+                        <a:t>0,852636767</a:t>
+                      </a:r>
+                      <a:endParaRPr lang="pl-PL" sz="1100" b="0" i="0" u="none" strike="noStrike">
+                        <a:solidFill>
+                          <a:srgbClr val="000000"/>
+                        </a:solidFill>
+                        <a:effectLst/>
+                        <a:latin typeface="Calibri" panose="020F0502020204030204" pitchFamily="34" charset="0"/>
+                      </a:endParaRPr>
+                    </a:p>
+                  </a:txBody>
+                  <a:tcPr marL="9525" marR="9525" marT="9525" marB="0" anchor="ctr">
+                    <a:lnL w="12700" cap="flat" cmpd="sng" algn="ctr">
+                      <a:solidFill>
+                        <a:schemeClr val="tx1"/>
+                      </a:solidFill>
+                      <a:prstDash val="solid"/>
+                      <a:round/>
+                      <a:headEnd type="none" w="med" len="med"/>
+                      <a:tailEnd type="none" w="med" len="med"/>
+                    </a:lnL>
+                    <a:lnR w="12700" cap="flat" cmpd="sng" algn="ctr">
+                      <a:solidFill>
+                        <a:schemeClr val="tx1"/>
+                      </a:solidFill>
+                      <a:prstDash val="solid"/>
+                      <a:round/>
+                      <a:headEnd type="none" w="med" len="med"/>
+                      <a:tailEnd type="none" w="med" len="med"/>
+                    </a:lnR>
+                    <a:lnT w="12700" cap="flat" cmpd="sng" algn="ctr">
+                      <a:solidFill>
+                        <a:schemeClr val="tx1"/>
+                      </a:solidFill>
+                      <a:prstDash val="solid"/>
+                      <a:round/>
+                      <a:headEnd type="none" w="med" len="med"/>
+                      <a:tailEnd type="none" w="med" len="med"/>
+                    </a:lnT>
+                    <a:lnB w="12700" cap="flat" cmpd="sng" algn="ctr">
+                      <a:solidFill>
+                        <a:schemeClr val="tx1"/>
+                      </a:solidFill>
+                      <a:prstDash val="solid"/>
+                      <a:round/>
+                      <a:headEnd type="none" w="med" len="med"/>
+                      <a:tailEnd type="none" w="med" len="med"/>
+                    </a:lnB>
+                  </a:tcPr>
+                </a:tc>
+                <a:tc>
+                  <a:txBody>
+                    <a:bodyPr/>
+                    <a:lstStyle/>
+                    <a:p>
+                      <a:pPr algn="ctr" fontAlgn="b"/>
+                      <a:r>
                         <a:rPr lang="pl-PL" sz="1100" u="none" strike="noStrike" dirty="0">
                           <a:effectLst/>
                         </a:rPr>
-                        <a:t>0,852637</a:t>
+                        <a:t>0,324091</a:t>
                       </a:r>
                       <a:endParaRPr lang="pl-PL" sz="1100" b="0" i="0" u="none" strike="noStrike" dirty="0">
                         <a:solidFill>
@@ -21095,72 +21871,12 @@
                     <a:p>
                       <a:pPr algn="ctr" fontAlgn="b"/>
                       <a:r>
-                        <a:rPr lang="pl-PL" sz="1100" u="none" strike="noStrike">
+                        <a:rPr lang="pl-PL" sz="1100" u="none" strike="noStrike" dirty="0">
                           <a:effectLst/>
                         </a:rPr>
-                        <a:t>0,324091</a:t>
+                        <a:t>0,46966</a:t>
                       </a:r>
-                      <a:endParaRPr lang="pl-PL" sz="1100" b="0" i="0" u="none" strike="noStrike">
-                        <a:solidFill>
-                          <a:srgbClr val="000000"/>
-                        </a:solidFill>
-                        <a:effectLst/>
-                        <a:latin typeface="Calibri" panose="020F0502020204030204" pitchFamily="34" charset="0"/>
-                      </a:endParaRPr>
-                    </a:p>
-                  </a:txBody>
-                  <a:tcPr marL="9525" marR="9525" marT="9525" marB="0" anchor="ctr">
-                    <a:lnL w="12700" cap="flat" cmpd="sng" algn="ctr">
-                      <a:solidFill>
-                        <a:schemeClr val="tx1"/>
-                      </a:solidFill>
-                      <a:prstDash val="solid"/>
-                      <a:round/>
-                      <a:headEnd type="none" w="med" len="med"/>
-                      <a:tailEnd type="none" w="med" len="med"/>
-                    </a:lnL>
-                    <a:lnR w="12700" cap="flat" cmpd="sng" algn="ctr">
-                      <a:solidFill>
-                        <a:schemeClr val="tx1"/>
-                      </a:solidFill>
-                      <a:prstDash val="solid"/>
-                      <a:round/>
-                      <a:headEnd type="none" w="med" len="med"/>
-                      <a:tailEnd type="none" w="med" len="med"/>
-                    </a:lnR>
-                    <a:lnT w="12700" cap="flat" cmpd="sng" algn="ctr">
-                      <a:solidFill>
-                        <a:schemeClr val="tx1"/>
-                      </a:solidFill>
-                      <a:prstDash val="solid"/>
-                      <a:round/>
-                      <a:headEnd type="none" w="med" len="med"/>
-                      <a:tailEnd type="none" w="med" len="med"/>
-                    </a:lnT>
-                    <a:lnB w="12700" cap="flat" cmpd="sng" algn="ctr">
-                      <a:solidFill>
-                        <a:schemeClr val="tx1"/>
-                      </a:solidFill>
-                      <a:prstDash val="solid"/>
-                      <a:round/>
-                      <a:headEnd type="none" w="med" len="med"/>
-                      <a:tailEnd type="none" w="med" len="med"/>
-                    </a:lnB>
-                  </a:tcPr>
-                </a:tc>
-                <a:tc>
-                  <a:txBody>
-                    <a:bodyPr/>
-                    <a:lstStyle/>
-                    <a:p>
-                      <a:pPr algn="ctr" fontAlgn="b"/>
-                      <a:r>
-                        <a:rPr lang="pl-PL" sz="1100" u="none" strike="noStrike">
-                          <a:effectLst/>
-                        </a:rPr>
-                        <a:t>0,469662</a:t>
-                      </a:r>
-                      <a:endParaRPr lang="pl-PL" sz="1100" b="0" i="0" u="none" strike="noStrike">
+                      <a:endParaRPr lang="pl-PL" sz="1100" b="0" i="0" u="none" strike="noStrike" dirty="0">
                         <a:solidFill>
                           <a:srgbClr val="000000"/>
                         </a:solidFill>
@@ -21335,12 +22051,12 @@
                     <a:p>
                       <a:pPr algn="ctr" fontAlgn="b"/>
                       <a:r>
-                        <a:rPr lang="pl-PL" sz="1100" u="none" strike="noStrike" dirty="0">
+                        <a:rPr lang="pl-PL" sz="1100" u="none" strike="noStrike">
                           <a:effectLst/>
                         </a:rPr>
                         <a:t>0,931476</a:t>
                       </a:r>
-                      <a:endParaRPr lang="pl-PL" sz="1100" b="0" i="0" u="none" strike="noStrike" dirty="0">
+                      <a:endParaRPr lang="pl-PL" sz="1100" b="0" i="0" u="none" strike="noStrike">
                         <a:solidFill>
                           <a:srgbClr val="000000"/>
                         </a:solidFill>
@@ -21638,7 +22354,7 @@
                         <a:rPr lang="pl-PL" sz="1100" u="none" strike="noStrike">
                           <a:effectLst/>
                         </a:rPr>
-                        <a:t>0,006841</a:t>
+                        <a:t>0,147363</a:t>
                       </a:r>
                       <a:endParaRPr lang="pl-PL" sz="1100" b="0" i="0" u="none" strike="noStrike">
                         <a:solidFill>
@@ -21750,11 +22466,11 @@
                 </a:tc>
                 <a:extLst>
                   <a:ext uri="{0D108BD9-81ED-4DB2-BD59-A6C34878D82A}">
-                    <a16:rowId xmlns:a16="http://schemas.microsoft.com/office/drawing/2014/main" val="2310678530"/>
+                    <a16:rowId xmlns:a16="http://schemas.microsoft.com/office/drawing/2014/main" val="4208313642"/>
                   </a:ext>
                 </a:extLst>
               </a:tr>
-              <a:tr h="321311">
+              <a:tr h="190500">
                 <a:tc>
                   <a:txBody>
                     <a:bodyPr/>
@@ -21762,12 +22478,24 @@
                     <a:p>
                       <a:pPr algn="ctr" fontAlgn="b"/>
                       <a:r>
-                        <a:rPr lang="pl-PL" sz="1100" u="none" strike="noStrike">
+                        <a:rPr lang="pl-PL" sz="1100" u="none" strike="noStrike" dirty="0">
                           <a:effectLst/>
                         </a:rPr>
-                        <a:t>LGB (oversample)</a:t>
+                        <a:t>LGB     (</a:t>
                       </a:r>
-                      <a:endParaRPr lang="pl-PL" sz="1100" b="0" i="0" u="none" strike="noStrike">
+                      <a:r>
+                        <a:rPr lang="pl-PL" sz="1100" u="none" strike="noStrike" dirty="0" err="1">
+                          <a:effectLst/>
+                        </a:rPr>
+                        <a:t>oversample</a:t>
+                      </a:r>
+                      <a:r>
+                        <a:rPr lang="pl-PL" sz="1100" u="none" strike="noStrike" dirty="0">
+                          <a:effectLst/>
+                        </a:rPr>
+                        <a:t>)</a:t>
+                      </a:r>
+                      <a:endParaRPr lang="pl-PL" sz="1100" b="0" i="0" u="none" strike="noStrike" dirty="0">
                         <a:solidFill>
                           <a:srgbClr val="000000"/>
                         </a:solidFill>
@@ -21825,7 +22553,7 @@
                         <a:rPr lang="pl-PL" sz="1100" u="none" strike="noStrike">
                           <a:effectLst/>
                         </a:rPr>
-                        <a:t>0,827501</a:t>
+                        <a:t>0,827501232</a:t>
                       </a:r>
                       <a:endParaRPr lang="pl-PL" sz="1100" b="0" i="0" u="none" strike="noStrike">
                         <a:solidFill>
@@ -21942,12 +22670,12 @@
                     <a:p>
                       <a:pPr algn="ctr" fontAlgn="b"/>
                       <a:r>
-                        <a:rPr lang="pl-PL" sz="1100" u="none" strike="noStrike">
+                        <a:rPr lang="pl-PL" sz="1100" u="none" strike="noStrike" dirty="0">
                           <a:effectLst/>
                         </a:rPr>
-                        <a:t>0,427444</a:t>
+                        <a:t>0,42744</a:t>
                       </a:r>
-                      <a:endParaRPr lang="pl-PL" sz="1100" b="0" i="0" u="none" strike="noStrike">
+                      <a:endParaRPr lang="pl-PL" sz="1100" b="0" i="0" u="none" strike="noStrike" dirty="0">
                         <a:solidFill>
                           <a:srgbClr val="000000"/>
                         </a:solidFill>
@@ -22122,12 +22850,12 @@
                     <a:p>
                       <a:pPr algn="ctr" fontAlgn="b"/>
                       <a:r>
-                        <a:rPr lang="pl-PL" sz="1100" u="none" strike="noStrike" dirty="0">
+                        <a:rPr lang="pl-PL" sz="1100" u="none" strike="noStrike">
                           <a:effectLst/>
                         </a:rPr>
                         <a:t>0,917183</a:t>
                       </a:r>
-                      <a:endParaRPr lang="pl-PL" sz="1100" b="0" i="0" u="none" strike="noStrike" dirty="0">
+                      <a:endParaRPr lang="pl-PL" sz="1100" b="0" i="0" u="none" strike="noStrike">
                         <a:solidFill>
                           <a:srgbClr val="000000"/>
                         </a:solidFill>
@@ -22182,12 +22910,12 @@
                     <a:p>
                       <a:pPr algn="ctr" fontAlgn="b"/>
                       <a:r>
-                        <a:rPr lang="pl-PL" sz="1100" u="none" strike="noStrike" dirty="0">
+                        <a:rPr lang="pl-PL" sz="1100" u="none" strike="noStrike">
                           <a:effectLst/>
                         </a:rPr>
                         <a:t>0,575626</a:t>
                       </a:r>
-                      <a:endParaRPr lang="pl-PL" sz="1100" b="0" i="0" u="none" strike="noStrike" dirty="0">
+                      <a:endParaRPr lang="pl-PL" sz="1100" b="0" i="0" u="none" strike="noStrike">
                         <a:solidFill>
                           <a:srgbClr val="000000"/>
                         </a:solidFill>
@@ -22425,7 +23153,7 @@
                         <a:rPr lang="pl-PL" sz="1100" u="none" strike="noStrike">
                           <a:effectLst/>
                         </a:rPr>
-                        <a:t>0,008007</a:t>
+                        <a:t>0,172499</a:t>
                       </a:r>
                       <a:endParaRPr lang="pl-PL" sz="1100" b="0" i="0" u="none" strike="noStrike">
                         <a:solidFill>
@@ -22537,11 +23265,11 @@
                 </a:tc>
                 <a:extLst>
                   <a:ext uri="{0D108BD9-81ED-4DB2-BD59-A6C34878D82A}">
-                    <a16:rowId xmlns:a16="http://schemas.microsoft.com/office/drawing/2014/main" val="66087046"/>
+                    <a16:rowId xmlns:a16="http://schemas.microsoft.com/office/drawing/2014/main" val="2394514387"/>
                   </a:ext>
                 </a:extLst>
               </a:tr>
-              <a:tr h="321311">
+              <a:tr h="190500">
                 <a:tc>
                   <a:txBody>
                     <a:bodyPr/>
@@ -22612,7 +23340,7 @@
                         <a:rPr lang="pl-PL" sz="1100" u="none" strike="noStrike">
                           <a:effectLst/>
                         </a:rPr>
-                        <a:t>0,825037</a:t>
+                        <a:t>0,825036964</a:t>
                       </a:r>
                       <a:endParaRPr lang="pl-PL" sz="1100" b="0" i="0" u="none" strike="noStrike">
                         <a:solidFill>
@@ -22729,12 +23457,12 @@
                     <a:p>
                       <a:pPr algn="ctr" fontAlgn="b"/>
                       <a:r>
-                        <a:rPr lang="pl-PL" sz="1100" u="none" strike="noStrike">
+                        <a:rPr lang="pl-PL" sz="1100" u="none" strike="noStrike" dirty="0">
                           <a:effectLst/>
                         </a:rPr>
-                        <a:t>0,528159</a:t>
+                        <a:t>0,52815</a:t>
                       </a:r>
-                      <a:endParaRPr lang="pl-PL" sz="1100" b="0" i="0" u="none" strike="noStrike">
+                      <a:endParaRPr lang="pl-PL" sz="1100" b="0" i="0" u="none" strike="noStrike" dirty="0">
                         <a:solidFill>
                           <a:srgbClr val="000000"/>
                         </a:solidFill>
@@ -23029,12 +23757,12 @@
                     <a:p>
                       <a:pPr algn="ctr" fontAlgn="b"/>
                       <a:r>
-                        <a:rPr lang="pl-PL" sz="1100" u="none" strike="noStrike" dirty="0">
+                        <a:rPr lang="pl-PL" sz="1100" u="none" strike="noStrike">
                           <a:effectLst/>
                         </a:rPr>
                         <a:t>0,068428</a:t>
                       </a:r>
-                      <a:endParaRPr lang="pl-PL" sz="1100" b="0" i="0" u="none" strike="noStrike" dirty="0">
+                      <a:endParaRPr lang="pl-PL" sz="1100" b="0" i="0" u="none" strike="noStrike">
                         <a:solidFill>
                           <a:srgbClr val="000000"/>
                         </a:solidFill>
@@ -23212,7 +23940,7 @@
                         <a:rPr lang="pl-PL" sz="1100" u="none" strike="noStrike">
                           <a:effectLst/>
                         </a:rPr>
-                        <a:t>0,008122</a:t>
+                        <a:t>0,174963</a:t>
                       </a:r>
                       <a:endParaRPr lang="pl-PL" sz="1100" b="0" i="0" u="none" strike="noStrike">
                         <a:solidFill>
@@ -23324,11 +24052,11 @@
                 </a:tc>
                 <a:extLst>
                   <a:ext uri="{0D108BD9-81ED-4DB2-BD59-A6C34878D82A}">
-                    <a16:rowId xmlns:a16="http://schemas.microsoft.com/office/drawing/2014/main" val="3691126754"/>
+                    <a16:rowId xmlns:a16="http://schemas.microsoft.com/office/drawing/2014/main" val="349783454"/>
                   </a:ext>
                 </a:extLst>
               </a:tr>
-              <a:tr h="321311">
+              <a:tr h="190500">
                 <a:tc>
                   <a:txBody>
                     <a:bodyPr/>
@@ -23399,7 +24127,7 @@
                         <a:rPr lang="pl-PL" sz="1100" u="none" strike="noStrike">
                           <a:effectLst/>
                         </a:rPr>
-                        <a:t>0,792016</a:t>
+                        <a:t>0,792015771</a:t>
                       </a:r>
                       <a:endParaRPr lang="pl-PL" sz="1100" b="0" i="0" u="none" strike="noStrike">
                         <a:solidFill>
@@ -23516,12 +24244,12 @@
                     <a:p>
                       <a:pPr algn="ctr" fontAlgn="b"/>
                       <a:r>
-                        <a:rPr lang="pl-PL" sz="1100" u="none" strike="noStrike">
+                        <a:rPr lang="pl-PL" sz="1100" u="none" strike="noStrike" dirty="0">
                           <a:effectLst/>
                         </a:rPr>
                         <a:t>0,54912</a:t>
                       </a:r>
-                      <a:endParaRPr lang="pl-PL" sz="1100" b="0" i="0" u="none" strike="noStrike">
+                      <a:endParaRPr lang="pl-PL" sz="1100" b="0" i="0" u="none" strike="noStrike" dirty="0">
                         <a:solidFill>
                           <a:srgbClr val="000000"/>
                         </a:solidFill>
@@ -23816,12 +24544,12 @@
                     <a:p>
                       <a:pPr algn="ctr" fontAlgn="b"/>
                       <a:r>
-                        <a:rPr lang="pl-PL" sz="1100" u="none" strike="noStrike" dirty="0">
+                        <a:rPr lang="pl-PL" sz="1100" u="none" strike="noStrike">
                           <a:effectLst/>
                         </a:rPr>
                         <a:t>0,060375</a:t>
                       </a:r>
-                      <a:endParaRPr lang="pl-PL" sz="1100" b="0" i="0" u="none" strike="noStrike" dirty="0">
+                      <a:endParaRPr lang="pl-PL" sz="1100" b="0" i="0" u="none" strike="noStrike">
                         <a:solidFill>
                           <a:srgbClr val="000000"/>
                         </a:solidFill>
@@ -23876,12 +24604,12 @@
                     <a:p>
                       <a:pPr algn="ctr" fontAlgn="b"/>
                       <a:r>
-                        <a:rPr lang="pl-PL" sz="1100" u="none" strike="noStrike" dirty="0">
+                        <a:rPr lang="pl-PL" sz="1100" u="none" strike="noStrike">
                           <a:effectLst/>
                         </a:rPr>
                         <a:t>0,05658</a:t>
                       </a:r>
-                      <a:endParaRPr lang="pl-PL" sz="1100" b="0" i="0" u="none" strike="noStrike" dirty="0">
+                      <a:endParaRPr lang="pl-PL" sz="1100" b="0" i="0" u="none" strike="noStrike">
                         <a:solidFill>
                           <a:srgbClr val="000000"/>
                         </a:solidFill>
@@ -23999,7 +24727,7 @@
                         <a:rPr lang="pl-PL" sz="1100" u="none" strike="noStrike">
                           <a:effectLst/>
                         </a:rPr>
-                        <a:t>0,009655</a:t>
+                        <a:t>0,207984</a:t>
                       </a:r>
                       <a:endParaRPr lang="pl-PL" sz="1100" b="0" i="0" u="none" strike="noStrike">
                         <a:solidFill>
@@ -24111,11 +24839,11 @@
                 </a:tc>
                 <a:extLst>
                   <a:ext uri="{0D108BD9-81ED-4DB2-BD59-A6C34878D82A}">
-                    <a16:rowId xmlns:a16="http://schemas.microsoft.com/office/drawing/2014/main" val="2256662025"/>
+                    <a16:rowId xmlns:a16="http://schemas.microsoft.com/office/drawing/2014/main" val="3717321575"/>
                   </a:ext>
                 </a:extLst>
               </a:tr>
-              <a:tr h="321311">
+              <a:tr h="190500">
                 <a:tc>
                   <a:txBody>
                     <a:bodyPr/>
@@ -24123,12 +24851,24 @@
                     <a:p>
                       <a:pPr algn="ctr" fontAlgn="b"/>
                       <a:r>
-                        <a:rPr lang="pl-PL" sz="1100" u="none" strike="noStrike">
+                        <a:rPr lang="pl-PL" sz="1100" u="none" strike="noStrike" dirty="0">
                           <a:effectLst/>
                         </a:rPr>
-                        <a:t>XGB (oversample)</a:t>
+                        <a:t>XGB    (</a:t>
                       </a:r>
-                      <a:endParaRPr lang="pl-PL" sz="1100" b="0" i="0" u="none" strike="noStrike">
+                      <a:r>
+                        <a:rPr lang="pl-PL" sz="1100" u="none" strike="noStrike" dirty="0" err="1">
+                          <a:effectLst/>
+                        </a:rPr>
+                        <a:t>oversample</a:t>
+                      </a:r>
+                      <a:r>
+                        <a:rPr lang="pl-PL" sz="1100" u="none" strike="noStrike" dirty="0">
+                          <a:effectLst/>
+                        </a:rPr>
+                        <a:t>)</a:t>
+                      </a:r>
+                      <a:endParaRPr lang="pl-PL" sz="1100" b="0" i="0" u="none" strike="noStrike" dirty="0">
                         <a:solidFill>
                           <a:srgbClr val="000000"/>
                         </a:solidFill>
@@ -24186,7 +24926,7 @@
                         <a:rPr lang="pl-PL" sz="1100" u="none" strike="noStrike">
                           <a:effectLst/>
                         </a:rPr>
-                        <a:t>0,695416</a:t>
+                        <a:t>0,695416461</a:t>
                       </a:r>
                       <a:endParaRPr lang="pl-PL" sz="1100" b="0" i="0" u="none" strike="noStrike">
                         <a:solidFill>
@@ -24303,12 +25043,12 @@
                     <a:p>
                       <a:pPr algn="ctr" fontAlgn="b"/>
                       <a:r>
-                        <a:rPr lang="pl-PL" sz="1100" u="none" strike="noStrike">
+                        <a:rPr lang="pl-PL" sz="1100" u="none" strike="noStrike" dirty="0">
                           <a:effectLst/>
                         </a:rPr>
-                        <a:t>0,796275</a:t>
+                        <a:t>0,79627</a:t>
                       </a:r>
-                      <a:endParaRPr lang="pl-PL" sz="1100" b="0" i="0" u="none" strike="noStrike">
+                      <a:endParaRPr lang="pl-PL" sz="1100" b="0" i="0" u="none" strike="noStrike" dirty="0">
                         <a:solidFill>
                           <a:srgbClr val="000000"/>
                         </a:solidFill>
@@ -24663,12 +25403,12 @@
                     <a:p>
                       <a:pPr algn="ctr" fontAlgn="b"/>
                       <a:r>
-                        <a:rPr lang="pl-PL" sz="1100" u="none" strike="noStrike" dirty="0">
+                        <a:rPr lang="pl-PL" sz="1100" u="none" strike="noStrike">
                           <a:effectLst/>
                         </a:rPr>
                         <a:t>0,100437</a:t>
                       </a:r>
-                      <a:endParaRPr lang="pl-PL" sz="1100" b="0" i="0" u="none" strike="noStrike" dirty="0">
+                      <a:endParaRPr lang="pl-PL" sz="1100" b="0" i="0" u="none" strike="noStrike">
                         <a:solidFill>
                           <a:srgbClr val="000000"/>
                         </a:solidFill>
@@ -24723,12 +25463,12 @@
                     <a:p>
                       <a:pPr algn="ctr" fontAlgn="b"/>
                       <a:r>
-                        <a:rPr lang="pl-PL" sz="1100" u="none" strike="noStrike" dirty="0">
+                        <a:rPr lang="pl-PL" sz="1100" u="none" strike="noStrike">
                           <a:effectLst/>
                         </a:rPr>
                         <a:t>0,2579</a:t>
                       </a:r>
-                      <a:endParaRPr lang="pl-PL" sz="1100" b="0" i="0" u="none" strike="noStrike" dirty="0">
+                      <a:endParaRPr lang="pl-PL" sz="1100" b="0" i="0" u="none" strike="noStrike">
                         <a:solidFill>
                           <a:srgbClr val="000000"/>
                         </a:solidFill>
@@ -24783,12 +25523,12 @@
                     <a:p>
                       <a:pPr algn="ctr" fontAlgn="b"/>
                       <a:r>
-                        <a:rPr lang="pl-PL" sz="1100" u="none" strike="noStrike" dirty="0">
+                        <a:rPr lang="pl-PL" sz="1100" u="none" strike="noStrike">
                           <a:effectLst/>
                         </a:rPr>
-                        <a:t>0,014139</a:t>
+                        <a:t>0,304584</a:t>
                       </a:r>
-                      <a:endParaRPr lang="pl-PL" sz="1100" b="0" i="0" u="none" strike="noStrike" dirty="0">
+                      <a:endParaRPr lang="pl-PL" sz="1100" b="0" i="0" u="none" strike="noStrike">
                         <a:solidFill>
                           <a:srgbClr val="000000"/>
                         </a:solidFill>
@@ -24898,7 +25638,7 @@
                 </a:tc>
                 <a:extLst>
                   <a:ext uri="{0D108BD9-81ED-4DB2-BD59-A6C34878D82A}">
-                    <a16:rowId xmlns:a16="http://schemas.microsoft.com/office/drawing/2014/main" val="3596699402"/>
+                    <a16:rowId xmlns:a16="http://schemas.microsoft.com/office/drawing/2014/main" val="2471990537"/>
                   </a:ext>
                 </a:extLst>
               </a:tr>
@@ -24910,6 +25650,1076 @@
     <p:extLst>
       <p:ext uri="{BB962C8B-B14F-4D97-AF65-F5344CB8AC3E}">
         <p14:creationId xmlns:p14="http://schemas.microsoft.com/office/powerpoint/2010/main" val="3193368905"/>
+      </p:ext>
+    </p:extLst>
+  </p:cSld>
+  <p:clrMapOvr>
+    <a:masterClrMapping/>
+  </p:clrMapOvr>
+</p:sld>
+</file>
+
+<file path=ppt/slides/slide15.xml><?xml version="1.0" encoding="utf-8"?>
+<p:sld xmlns:a="http://schemas.openxmlformats.org/drawingml/2006/main" xmlns:r="http://schemas.openxmlformats.org/officeDocument/2006/relationships" xmlns:p="http://schemas.openxmlformats.org/presentationml/2006/main">
+  <p:cSld>
+    <p:bg>
+      <p:bgPr>
+        <a:solidFill>
+          <a:schemeClr val="bg1"/>
+        </a:solidFill>
+        <a:effectLst/>
+      </p:bgPr>
+    </p:bg>
+    <p:spTree>
+      <p:nvGrpSpPr>
+        <p:cNvPr id="1" name=""/>
+        <p:cNvGrpSpPr/>
+        <p:nvPr/>
+      </p:nvGrpSpPr>
+      <p:grpSpPr>
+        <a:xfrm>
+          <a:off x="0" y="0"/>
+          <a:ext cx="0" cy="0"/>
+          <a:chOff x="0" y="0"/>
+          <a:chExt cx="0" cy="0"/>
+        </a:xfrm>
+      </p:grpSpPr>
+      <p:sp useBgFill="1">
+        <p:nvSpPr>
+          <p:cNvPr id="11" name="Rectangle 13">
+            <a:extLst>
+              <a:ext uri="{FF2B5EF4-FFF2-40B4-BE49-F238E27FC236}">
+                <a16:creationId xmlns:a16="http://schemas.microsoft.com/office/drawing/2014/main" id="{3DAD86CA-8235-409B-982B-5E7A033E2392}"/>
+              </a:ext>
+              <a:ext uri="{C183D7F6-B498-43B3-948B-1728B52AA6E4}">
+                <adec:decorative xmlns:adec="http://schemas.microsoft.com/office/drawing/2017/decorative" val="1"/>
+              </a:ext>
+            </a:extLst>
+          </p:cNvPr>
+          <p:cNvSpPr>
+            <a:spLocks noGrp="1" noRot="1" noChangeAspect="1" noMove="1" noResize="1" noEditPoints="1" noAdjustHandles="1" noChangeArrowheads="1" noChangeShapeType="1" noTextEdit="1"/>
+          </p:cNvSpPr>
+          <p:nvPr>
+            <p:extLst>
+              <p:ext uri="{386F3935-93C4-4BCD-93E2-E3B085C9AB24}">
+                <p16:designElem xmlns:p16="http://schemas.microsoft.com/office/powerpoint/2015/main" val="1"/>
+              </p:ext>
+            </p:extLst>
+          </p:nvPr>
+        </p:nvSpPr>
+        <p:spPr>
+          <a:xfrm>
+            <a:off x="0" y="0"/>
+            <a:ext cx="12191999" cy="6857365"/>
+          </a:xfrm>
+          <a:prstGeom prst="rect">
+            <a:avLst/>
+          </a:prstGeom>
+          <a:ln>
+            <a:noFill/>
+          </a:ln>
+        </p:spPr>
+        <p:style>
+          <a:lnRef idx="2">
+            <a:schemeClr val="accent1">
+              <a:shade val="50000"/>
+            </a:schemeClr>
+          </a:lnRef>
+          <a:fillRef idx="1">
+            <a:schemeClr val="accent1"/>
+          </a:fillRef>
+          <a:effectRef idx="0">
+            <a:schemeClr val="accent1"/>
+          </a:effectRef>
+          <a:fontRef idx="minor">
+            <a:schemeClr val="lt1"/>
+          </a:fontRef>
+        </p:style>
+        <p:txBody>
+          <a:bodyPr rtlCol="0" anchor="ctr"/>
+          <a:lstStyle/>
+          <a:p>
+            <a:pPr algn="ctr"/>
+            <a:endParaRPr lang="en-US"/>
+          </a:p>
+        </p:txBody>
+      </p:sp>
+      <p:sp>
+        <p:nvSpPr>
+          <p:cNvPr id="12" name="Rectangle 15">
+            <a:extLst>
+              <a:ext uri="{FF2B5EF4-FFF2-40B4-BE49-F238E27FC236}">
+                <a16:creationId xmlns:a16="http://schemas.microsoft.com/office/drawing/2014/main" id="{9F234FBA-3501-47B4-AE0C-AA4AFBC8F603}"/>
+              </a:ext>
+              <a:ext uri="{C183D7F6-B498-43B3-948B-1728B52AA6E4}">
+                <adec:decorative xmlns:adec="http://schemas.microsoft.com/office/drawing/2017/decorative" val="1"/>
+              </a:ext>
+            </a:extLst>
+          </p:cNvPr>
+          <p:cNvSpPr>
+            <a:spLocks noGrp="1" noRot="1" noChangeAspect="1" noMove="1" noResize="1" noEditPoints="1" noAdjustHandles="1" noChangeArrowheads="1" noChangeShapeType="1" noTextEdit="1"/>
+          </p:cNvSpPr>
+          <p:nvPr>
+            <p:extLst>
+              <p:ext uri="{386F3935-93C4-4BCD-93E2-E3B085C9AB24}">
+                <p16:designElem xmlns:p16="http://schemas.microsoft.com/office/powerpoint/2015/main" val="1"/>
+              </p:ext>
+            </p:extLst>
+          </p:nvPr>
+        </p:nvSpPr>
+        <p:spPr>
+          <a:xfrm>
+            <a:off x="0" y="1"/>
+            <a:ext cx="12192000" cy="5187142"/>
+          </a:xfrm>
+          <a:prstGeom prst="rect">
+            <a:avLst/>
+          </a:prstGeom>
+          <a:solidFill>
+            <a:schemeClr val="accent4"/>
+          </a:solidFill>
+          <a:ln>
+            <a:noFill/>
+          </a:ln>
+        </p:spPr>
+        <p:style>
+          <a:lnRef idx="2">
+            <a:schemeClr val="accent1">
+              <a:shade val="50000"/>
+            </a:schemeClr>
+          </a:lnRef>
+          <a:fillRef idx="1">
+            <a:schemeClr val="accent1"/>
+          </a:fillRef>
+          <a:effectRef idx="0">
+            <a:schemeClr val="accent1"/>
+          </a:effectRef>
+          <a:fontRef idx="minor">
+            <a:schemeClr val="lt1"/>
+          </a:fontRef>
+        </p:style>
+        <p:txBody>
+          <a:bodyPr rtlCol="0" anchor="ctr"/>
+          <a:lstStyle/>
+          <a:p>
+            <a:pPr algn="ctr"/>
+            <a:endParaRPr lang="en-US" dirty="0"/>
+          </a:p>
+        </p:txBody>
+      </p:sp>
+      <p:sp>
+        <p:nvSpPr>
+          <p:cNvPr id="18" name="Rectangle 17">
+            <a:extLst>
+              <a:ext uri="{FF2B5EF4-FFF2-40B4-BE49-F238E27FC236}">
+                <a16:creationId xmlns:a16="http://schemas.microsoft.com/office/drawing/2014/main" id="{B5EF893B-0491-416E-9D33-BADE9600792A}"/>
+              </a:ext>
+              <a:ext uri="{C183D7F6-B498-43B3-948B-1728B52AA6E4}">
+                <adec:decorative xmlns:adec="http://schemas.microsoft.com/office/drawing/2017/decorative" val="1"/>
+              </a:ext>
+            </a:extLst>
+          </p:cNvPr>
+          <p:cNvSpPr>
+            <a:spLocks noGrp="1" noRot="1" noChangeAspect="1" noMove="1" noResize="1" noEditPoints="1" noAdjustHandles="1" noChangeArrowheads="1" noChangeShapeType="1" noTextEdit="1"/>
+          </p:cNvSpPr>
+          <p:nvPr>
+            <p:extLst>
+              <p:ext uri="{386F3935-93C4-4BCD-93E2-E3B085C9AB24}">
+                <p16:designElem xmlns:p16="http://schemas.microsoft.com/office/powerpoint/2015/main" val="1"/>
+              </p:ext>
+            </p:extLst>
+          </p:nvPr>
+        </p:nvSpPr>
+        <p:spPr>
+          <a:xfrm>
+            <a:off x="596464" y="551961"/>
+            <a:ext cx="10999072" cy="5399950"/>
+          </a:xfrm>
+          <a:prstGeom prst="rect">
+            <a:avLst/>
+          </a:prstGeom>
+          <a:solidFill>
+            <a:schemeClr val="bg1"/>
+          </a:solidFill>
+          <a:ln>
+            <a:noFill/>
+          </a:ln>
+          <a:effectLst>
+            <a:outerShdw blurRad="139700" dist="127000" dir="5400000" algn="t" rotWithShape="0">
+              <a:prstClr val="black">
+                <a:alpha val="15000"/>
+              </a:prstClr>
+            </a:outerShdw>
+          </a:effectLst>
+        </p:spPr>
+        <p:style>
+          <a:lnRef idx="2">
+            <a:schemeClr val="accent1">
+              <a:shade val="50000"/>
+            </a:schemeClr>
+          </a:lnRef>
+          <a:fillRef idx="1">
+            <a:schemeClr val="accent1"/>
+          </a:fillRef>
+          <a:effectRef idx="0">
+            <a:schemeClr val="accent1"/>
+          </a:effectRef>
+          <a:fontRef idx="minor">
+            <a:schemeClr val="lt1"/>
+          </a:fontRef>
+        </p:style>
+        <p:txBody>
+          <a:bodyPr rtlCol="0" anchor="ctr"/>
+          <a:lstStyle/>
+          <a:p>
+            <a:pPr algn="ctr"/>
+            <a:endParaRPr lang="en-US"/>
+          </a:p>
+        </p:txBody>
+      </p:sp>
+      <p:pic>
+        <p:nvPicPr>
+          <p:cNvPr id="9" name="Symbol zastępczy zawartości 8">
+            <a:extLst>
+              <a:ext uri="{FF2B5EF4-FFF2-40B4-BE49-F238E27FC236}">
+                <a16:creationId xmlns:a16="http://schemas.microsoft.com/office/drawing/2014/main" id="{FE95534B-136D-F420-4AE2-19DCE60ED5D6}"/>
+              </a:ext>
+            </a:extLst>
+          </p:cNvPr>
+          <p:cNvPicPr>
+            <a:picLocks noGrp="1" noChangeAspect="1"/>
+          </p:cNvPicPr>
+          <p:nvPr>
+            <p:ph idx="1"/>
+          </p:nvPr>
+        </p:nvPicPr>
+        <p:blipFill rotWithShape="1">
+          <a:blip r:embed="rId3"/>
+          <a:srcRect t="487" b="-1308"/>
+          <a:stretch/>
+        </p:blipFill>
+        <p:spPr>
+          <a:xfrm>
+            <a:off x="2597256" y="562173"/>
+            <a:ext cx="6997485" cy="5379526"/>
+          </a:xfrm>
+          <a:prstGeom prst="rect">
+            <a:avLst/>
+          </a:prstGeom>
+        </p:spPr>
+      </p:pic>
+      <p:cxnSp>
+        <p:nvCxnSpPr>
+          <p:cNvPr id="20" name="Straight Connector 19">
+            <a:extLst>
+              <a:ext uri="{FF2B5EF4-FFF2-40B4-BE49-F238E27FC236}">
+                <a16:creationId xmlns:a16="http://schemas.microsoft.com/office/drawing/2014/main" id="{469F4FF8-F8B0-4630-BA1B-0D8B324CD5FF}"/>
+              </a:ext>
+              <a:ext uri="{C183D7F6-B498-43B3-948B-1728B52AA6E4}">
+                <adec:decorative xmlns:adec="http://schemas.microsoft.com/office/drawing/2017/decorative" val="1"/>
+              </a:ext>
+            </a:extLst>
+          </p:cNvPr>
+          <p:cNvCxnSpPr>
+            <a:cxnSpLocks noGrp="1" noRot="1" noChangeAspect="1" noMove="1" noResize="1" noEditPoints="1" noAdjustHandles="1" noChangeArrowheads="1" noChangeShapeType="1"/>
+          </p:cNvCxnSpPr>
+          <p:nvPr>
+            <p:extLst>
+              <p:ext uri="{386F3935-93C4-4BCD-93E2-E3B085C9AB24}">
+                <p16:designElem xmlns:p16="http://schemas.microsoft.com/office/powerpoint/2015/main" val="1"/>
+              </p:ext>
+            </p:extLst>
+          </p:nvPr>
+        </p:nvCxnSpPr>
+        <p:spPr>
+          <a:xfrm flipH="1">
+            <a:off x="596464" y="6329769"/>
+            <a:ext cx="11000232" cy="0"/>
+          </a:xfrm>
+          <a:prstGeom prst="line">
+            <a:avLst/>
+          </a:prstGeom>
+          <a:ln w="152400">
+            <a:solidFill>
+              <a:schemeClr val="accent4"/>
+            </a:solidFill>
+          </a:ln>
+        </p:spPr>
+        <p:style>
+          <a:lnRef idx="1">
+            <a:schemeClr val="accent1"/>
+          </a:lnRef>
+          <a:fillRef idx="0">
+            <a:schemeClr val="accent1"/>
+          </a:fillRef>
+          <a:effectRef idx="0">
+            <a:schemeClr val="accent1"/>
+          </a:effectRef>
+          <a:fontRef idx="minor">
+            <a:schemeClr val="tx1"/>
+          </a:fontRef>
+        </p:style>
+      </p:cxnSp>
+    </p:spTree>
+    <p:extLst>
+      <p:ext uri="{BB962C8B-B14F-4D97-AF65-F5344CB8AC3E}">
+        <p14:creationId xmlns:p14="http://schemas.microsoft.com/office/powerpoint/2010/main" val="4159821060"/>
+      </p:ext>
+    </p:extLst>
+  </p:cSld>
+  <p:clrMapOvr>
+    <a:masterClrMapping/>
+  </p:clrMapOvr>
+</p:sld>
+</file>
+
+<file path=ppt/slides/slide16.xml><?xml version="1.0" encoding="utf-8"?>
+<p:sld xmlns:a="http://schemas.openxmlformats.org/drawingml/2006/main" xmlns:r="http://schemas.openxmlformats.org/officeDocument/2006/relationships" xmlns:p="http://schemas.openxmlformats.org/presentationml/2006/main">
+  <p:cSld>
+    <p:bg>
+      <p:bgPr>
+        <a:solidFill>
+          <a:schemeClr val="bg1"/>
+        </a:solidFill>
+        <a:effectLst/>
+      </p:bgPr>
+    </p:bg>
+    <p:spTree>
+      <p:nvGrpSpPr>
+        <p:cNvPr id="1" name=""/>
+        <p:cNvGrpSpPr/>
+        <p:nvPr/>
+      </p:nvGrpSpPr>
+      <p:grpSpPr>
+        <a:xfrm>
+          <a:off x="0" y="0"/>
+          <a:ext cx="0" cy="0"/>
+          <a:chOff x="0" y="0"/>
+          <a:chExt cx="0" cy="0"/>
+        </a:xfrm>
+      </p:grpSpPr>
+      <p:sp useBgFill="1">
+        <p:nvSpPr>
+          <p:cNvPr id="11" name="Rectangle 10">
+            <a:extLst>
+              <a:ext uri="{FF2B5EF4-FFF2-40B4-BE49-F238E27FC236}">
+                <a16:creationId xmlns:a16="http://schemas.microsoft.com/office/drawing/2014/main" id="{700E0F77-E936-4985-B7B1-B9823486AC33}"/>
+              </a:ext>
+              <a:ext uri="{C183D7F6-B498-43B3-948B-1728B52AA6E4}">
+                <adec:decorative xmlns:adec="http://schemas.microsoft.com/office/drawing/2017/decorative" val="1"/>
+              </a:ext>
+            </a:extLst>
+          </p:cNvPr>
+          <p:cNvSpPr>
+            <a:spLocks noGrp="1" noRot="1" noChangeAspect="1" noMove="1" noResize="1" noEditPoints="1" noAdjustHandles="1" noChangeArrowheads="1" noChangeShapeType="1" noTextEdit="1"/>
+          </p:cNvSpPr>
+          <p:nvPr>
+            <p:extLst>
+              <p:ext uri="{386F3935-93C4-4BCD-93E2-E3B085C9AB24}">
+                <p16:designElem xmlns:p16="http://schemas.microsoft.com/office/powerpoint/2015/main" val="1"/>
+              </p:ext>
+            </p:extLst>
+          </p:nvPr>
+        </p:nvSpPr>
+        <p:spPr>
+          <a:xfrm>
+            <a:off x="0" y="0"/>
+            <a:ext cx="12191999" cy="6857365"/>
+          </a:xfrm>
+          <a:prstGeom prst="rect">
+            <a:avLst/>
+          </a:prstGeom>
+          <a:ln>
+            <a:noFill/>
+          </a:ln>
+        </p:spPr>
+        <p:style>
+          <a:lnRef idx="2">
+            <a:schemeClr val="accent1">
+              <a:shade val="50000"/>
+            </a:schemeClr>
+          </a:lnRef>
+          <a:fillRef idx="1">
+            <a:schemeClr val="accent1"/>
+          </a:fillRef>
+          <a:effectRef idx="0">
+            <a:schemeClr val="accent1"/>
+          </a:effectRef>
+          <a:fontRef idx="minor">
+            <a:schemeClr val="lt1"/>
+          </a:fontRef>
+        </p:style>
+        <p:txBody>
+          <a:bodyPr rtlCol="0" anchor="ctr"/>
+          <a:lstStyle/>
+          <a:p>
+            <a:pPr algn="ctr"/>
+            <a:endParaRPr lang="en-US"/>
+          </a:p>
+        </p:txBody>
+      </p:sp>
+      <p:sp>
+        <p:nvSpPr>
+          <p:cNvPr id="2" name="Tytuł 1">
+            <a:extLst>
+              <a:ext uri="{FF2B5EF4-FFF2-40B4-BE49-F238E27FC236}">
+                <a16:creationId xmlns:a16="http://schemas.microsoft.com/office/drawing/2014/main" id="{8E0A0B91-D310-F2C3-521C-9C86EE56DD02}"/>
+              </a:ext>
+            </a:extLst>
+          </p:cNvPr>
+          <p:cNvSpPr>
+            <a:spLocks noGrp="1"/>
+          </p:cNvSpPr>
+          <p:nvPr>
+            <p:ph type="title"/>
+          </p:nvPr>
+        </p:nvSpPr>
+        <p:spPr>
+          <a:xfrm>
+            <a:off x="517889" y="4883544"/>
+            <a:ext cx="3876086" cy="1556907"/>
+          </a:xfrm>
+        </p:spPr>
+        <p:txBody>
+          <a:bodyPr anchor="ctr">
+            <a:normAutofit/>
+          </a:bodyPr>
+          <a:lstStyle/>
+          <a:p>
+            <a:r>
+              <a:rPr lang="pl-PL" sz="3200" dirty="0" err="1"/>
+              <a:t>Feature</a:t>
+            </a:r>
+            <a:r>
+              <a:rPr lang="pl-PL" sz="3200" dirty="0"/>
+              <a:t> </a:t>
+            </a:r>
+            <a:r>
+              <a:rPr lang="pl-PL" sz="3200" dirty="0" err="1"/>
+              <a:t>importance</a:t>
+            </a:r>
+            <a:endParaRPr lang="pl-PL" sz="3200" dirty="0"/>
+          </a:p>
+        </p:txBody>
+      </p:sp>
+      <p:sp>
+        <p:nvSpPr>
+          <p:cNvPr id="13" name="Rectangle 12">
+            <a:extLst>
+              <a:ext uri="{FF2B5EF4-FFF2-40B4-BE49-F238E27FC236}">
+                <a16:creationId xmlns:a16="http://schemas.microsoft.com/office/drawing/2014/main" id="{95C8260E-968F-44E8-A823-ABB431311926}"/>
+              </a:ext>
+              <a:ext uri="{C183D7F6-B498-43B3-948B-1728B52AA6E4}">
+                <adec:decorative xmlns:adec="http://schemas.microsoft.com/office/drawing/2017/decorative" val="1"/>
+              </a:ext>
+            </a:extLst>
+          </p:cNvPr>
+          <p:cNvSpPr>
+            <a:spLocks noGrp="1" noRot="1" noChangeAspect="1" noMove="1" noResize="1" noEditPoints="1" noAdjustHandles="1" noChangeArrowheads="1" noChangeShapeType="1" noTextEdit="1"/>
+          </p:cNvSpPr>
+          <p:nvPr>
+            <p:extLst>
+              <p:ext uri="{386F3935-93C4-4BCD-93E2-E3B085C9AB24}">
+                <p16:designElem xmlns:p16="http://schemas.microsoft.com/office/powerpoint/2015/main" val="1"/>
+              </p:ext>
+            </p:extLst>
+          </p:nvPr>
+        </p:nvSpPr>
+        <p:spPr>
+          <a:xfrm>
+            <a:off x="0" y="0"/>
+            <a:ext cx="12192000" cy="865848"/>
+          </a:xfrm>
+          <a:prstGeom prst="rect">
+            <a:avLst/>
+          </a:prstGeom>
+          <a:solidFill>
+            <a:schemeClr val="accent4"/>
+          </a:solidFill>
+          <a:ln>
+            <a:noFill/>
+          </a:ln>
+        </p:spPr>
+        <p:style>
+          <a:lnRef idx="2">
+            <a:schemeClr val="accent1">
+              <a:shade val="50000"/>
+            </a:schemeClr>
+          </a:lnRef>
+          <a:fillRef idx="1">
+            <a:schemeClr val="accent1"/>
+          </a:fillRef>
+          <a:effectRef idx="0">
+            <a:schemeClr val="accent1"/>
+          </a:effectRef>
+          <a:fontRef idx="minor">
+            <a:schemeClr val="lt1"/>
+          </a:fontRef>
+        </p:style>
+        <p:txBody>
+          <a:bodyPr rtlCol="0" anchor="ctr"/>
+          <a:lstStyle/>
+          <a:p>
+            <a:pPr algn="ctr"/>
+            <a:endParaRPr lang="en-US"/>
+          </a:p>
+        </p:txBody>
+      </p:sp>
+      <p:sp>
+        <p:nvSpPr>
+          <p:cNvPr id="15" name="Rectangle 14">
+            <a:extLst>
+              <a:ext uri="{FF2B5EF4-FFF2-40B4-BE49-F238E27FC236}">
+                <a16:creationId xmlns:a16="http://schemas.microsoft.com/office/drawing/2014/main" id="{2C1BBA94-3F40-40AA-8BB9-E69E25E537C1}"/>
+              </a:ext>
+              <a:ext uri="{C183D7F6-B498-43B3-948B-1728B52AA6E4}">
+                <adec:decorative xmlns:adec="http://schemas.microsoft.com/office/drawing/2017/decorative" val="1"/>
+              </a:ext>
+            </a:extLst>
+          </p:cNvPr>
+          <p:cNvSpPr>
+            <a:spLocks noGrp="1" noRot="1" noChangeAspect="1" noMove="1" noResize="1" noEditPoints="1" noAdjustHandles="1" noChangeArrowheads="1" noChangeShapeType="1" noTextEdit="1"/>
+          </p:cNvSpPr>
+          <p:nvPr>
+            <p:extLst>
+              <p:ext uri="{386F3935-93C4-4BCD-93E2-E3B085C9AB24}">
+                <p16:designElem xmlns:p16="http://schemas.microsoft.com/office/powerpoint/2015/main" val="1"/>
+              </p:ext>
+            </p:extLst>
+          </p:nvPr>
+        </p:nvSpPr>
+        <p:spPr>
+          <a:xfrm>
+            <a:off x="517889" y="0"/>
+            <a:ext cx="11231745" cy="4588184"/>
+          </a:xfrm>
+          <a:prstGeom prst="rect">
+            <a:avLst/>
+          </a:prstGeom>
+          <a:solidFill>
+            <a:schemeClr val="bg1"/>
+          </a:solidFill>
+          <a:ln>
+            <a:noFill/>
+          </a:ln>
+          <a:effectLst>
+            <a:outerShdw blurRad="139700" dist="127000" dir="5400000" algn="t" rotWithShape="0">
+              <a:prstClr val="black">
+                <a:alpha val="15000"/>
+              </a:prstClr>
+            </a:outerShdw>
+          </a:effectLst>
+        </p:spPr>
+        <p:style>
+          <a:lnRef idx="2">
+            <a:schemeClr val="accent1">
+              <a:shade val="50000"/>
+            </a:schemeClr>
+          </a:lnRef>
+          <a:fillRef idx="1">
+            <a:schemeClr val="accent1"/>
+          </a:fillRef>
+          <a:effectRef idx="0">
+            <a:schemeClr val="accent1"/>
+          </a:effectRef>
+          <a:fontRef idx="minor">
+            <a:schemeClr val="lt1"/>
+          </a:fontRef>
+        </p:style>
+        <p:txBody>
+          <a:bodyPr rtlCol="0" anchor="ctr"/>
+          <a:lstStyle/>
+          <a:p>
+            <a:pPr algn="ctr"/>
+            <a:endParaRPr lang="en-US"/>
+          </a:p>
+        </p:txBody>
+      </p:sp>
+      <p:pic>
+        <p:nvPicPr>
+          <p:cNvPr id="4" name="Symbol zastępczy zawartości 3">
+            <a:extLst>
+              <a:ext uri="{FF2B5EF4-FFF2-40B4-BE49-F238E27FC236}">
+                <a16:creationId xmlns:a16="http://schemas.microsoft.com/office/drawing/2014/main" id="{3A194C92-9DBE-6A0E-5182-1BAA397C94CE}"/>
+              </a:ext>
+            </a:extLst>
+          </p:cNvPr>
+          <p:cNvPicPr>
+            <a:picLocks noChangeAspect="1"/>
+          </p:cNvPicPr>
+          <p:nvPr/>
+        </p:nvPicPr>
+        <p:blipFill>
+          <a:blip r:embed="rId3"/>
+          <a:stretch>
+            <a:fillRect/>
+          </a:stretch>
+        </p:blipFill>
+        <p:spPr>
+          <a:xfrm>
+            <a:off x="2866067" y="364142"/>
+            <a:ext cx="6555921" cy="3867993"/>
+          </a:xfrm>
+          <a:prstGeom prst="rect">
+            <a:avLst/>
+          </a:prstGeom>
+        </p:spPr>
+      </p:pic>
+      <p:sp>
+        <p:nvSpPr>
+          <p:cNvPr id="17" name="Rectangle 16">
+            <a:extLst>
+              <a:ext uri="{FF2B5EF4-FFF2-40B4-BE49-F238E27FC236}">
+                <a16:creationId xmlns:a16="http://schemas.microsoft.com/office/drawing/2014/main" id="{FE43805F-24A6-46A4-B19B-54F28347355C}"/>
+              </a:ext>
+              <a:ext uri="{C183D7F6-B498-43B3-948B-1728B52AA6E4}">
+                <adec:decorative xmlns:adec="http://schemas.microsoft.com/office/drawing/2017/decorative" val="1"/>
+              </a:ext>
+            </a:extLst>
+          </p:cNvPr>
+          <p:cNvSpPr>
+            <a:spLocks noGrp="1" noRot="1" noChangeAspect="1" noMove="1" noResize="1" noEditPoints="1" noAdjustHandles="1" noChangeArrowheads="1" noChangeShapeType="1" noTextEdit="1"/>
+          </p:cNvSpPr>
+          <p:nvPr>
+            <p:extLst>
+              <p:ext uri="{386F3935-93C4-4BCD-93E2-E3B085C9AB24}">
+                <p16:designElem xmlns:p16="http://schemas.microsoft.com/office/powerpoint/2015/main" val="1"/>
+              </p:ext>
+            </p:extLst>
+          </p:nvPr>
+        </p:nvSpPr>
+        <p:spPr>
+          <a:xfrm rot="5400000" flipH="1">
+            <a:off x="4001107" y="5661132"/>
+            <a:ext cx="1463040" cy="45719"/>
+          </a:xfrm>
+          <a:prstGeom prst="rect">
+            <a:avLst/>
+          </a:prstGeom>
+          <a:solidFill>
+            <a:schemeClr val="accent4"/>
+          </a:solidFill>
+          <a:ln>
+            <a:noFill/>
+          </a:ln>
+        </p:spPr>
+        <p:style>
+          <a:lnRef idx="2">
+            <a:schemeClr val="accent1">
+              <a:shade val="50000"/>
+            </a:schemeClr>
+          </a:lnRef>
+          <a:fillRef idx="1">
+            <a:schemeClr val="accent1"/>
+          </a:fillRef>
+          <a:effectRef idx="0">
+            <a:schemeClr val="accent1"/>
+          </a:effectRef>
+          <a:fontRef idx="minor">
+            <a:schemeClr val="lt1"/>
+          </a:fontRef>
+        </p:style>
+        <p:txBody>
+          <a:bodyPr rtlCol="0" anchor="ctr"/>
+          <a:lstStyle/>
+          <a:p>
+            <a:pPr algn="ctr"/>
+            <a:endParaRPr lang="en-US"/>
+          </a:p>
+        </p:txBody>
+      </p:sp>
+      <p:sp>
+        <p:nvSpPr>
+          <p:cNvPr id="8" name="Content Placeholder 7">
+            <a:extLst>
+              <a:ext uri="{FF2B5EF4-FFF2-40B4-BE49-F238E27FC236}">
+                <a16:creationId xmlns:a16="http://schemas.microsoft.com/office/drawing/2014/main" id="{7852CC5D-3C23-F1F0-2F13-455D11EE5F60}"/>
+              </a:ext>
+            </a:extLst>
+          </p:cNvPr>
+          <p:cNvSpPr>
+            <a:spLocks noGrp="1"/>
+          </p:cNvSpPr>
+          <p:nvPr>
+            <p:ph idx="1"/>
+          </p:nvPr>
+        </p:nvSpPr>
+        <p:spPr>
+          <a:xfrm>
+            <a:off x="5162719" y="4883544"/>
+            <a:ext cx="6586915" cy="1556907"/>
+          </a:xfrm>
+        </p:spPr>
+        <p:txBody>
+          <a:bodyPr anchor="ctr">
+            <a:normAutofit/>
+          </a:bodyPr>
+          <a:lstStyle/>
+          <a:p>
+            <a:endParaRPr lang="en-US" sz="1800"/>
+          </a:p>
+        </p:txBody>
+      </p:sp>
+    </p:spTree>
+    <p:extLst>
+      <p:ext uri="{BB962C8B-B14F-4D97-AF65-F5344CB8AC3E}">
+        <p14:creationId xmlns:p14="http://schemas.microsoft.com/office/powerpoint/2010/main" val="129961736"/>
+      </p:ext>
+    </p:extLst>
+  </p:cSld>
+  <p:clrMapOvr>
+    <a:masterClrMapping/>
+  </p:clrMapOvr>
+</p:sld>
+</file>
+
+<file path=ppt/slides/slide17.xml><?xml version="1.0" encoding="utf-8"?>
+<p:sld xmlns:a="http://schemas.openxmlformats.org/drawingml/2006/main" xmlns:r="http://schemas.openxmlformats.org/officeDocument/2006/relationships" xmlns:p="http://schemas.openxmlformats.org/presentationml/2006/main">
+  <p:cSld>
+    <p:bg>
+      <p:bgPr>
+        <a:solidFill>
+          <a:schemeClr val="bg1"/>
+        </a:solidFill>
+        <a:effectLst/>
+      </p:bgPr>
+    </p:bg>
+    <p:spTree>
+      <p:nvGrpSpPr>
+        <p:cNvPr id="1" name=""/>
+        <p:cNvGrpSpPr/>
+        <p:nvPr/>
+      </p:nvGrpSpPr>
+      <p:grpSpPr>
+        <a:xfrm>
+          <a:off x="0" y="0"/>
+          <a:ext cx="0" cy="0"/>
+          <a:chOff x="0" y="0"/>
+          <a:chExt cx="0" cy="0"/>
+        </a:xfrm>
+      </p:grpSpPr>
+      <p:sp useBgFill="1">
+        <p:nvSpPr>
+          <p:cNvPr id="8" name="Rectangle 7">
+            <a:extLst>
+              <a:ext uri="{FF2B5EF4-FFF2-40B4-BE49-F238E27FC236}">
+                <a16:creationId xmlns:a16="http://schemas.microsoft.com/office/drawing/2014/main" id="{4522B21E-B2B9-4C72-9A71-C87EFD137480}"/>
+              </a:ext>
+              <a:ext uri="{C183D7F6-B498-43B3-948B-1728B52AA6E4}">
+                <adec:decorative xmlns:adec="http://schemas.microsoft.com/office/drawing/2017/decorative" val="1"/>
+              </a:ext>
+            </a:extLst>
+          </p:cNvPr>
+          <p:cNvSpPr>
+            <a:spLocks noGrp="1" noRot="1" noChangeAspect="1" noMove="1" noResize="1" noEditPoints="1" noAdjustHandles="1" noChangeArrowheads="1" noChangeShapeType="1" noTextEdit="1"/>
+          </p:cNvSpPr>
+          <p:nvPr>
+            <p:extLst>
+              <p:ext uri="{386F3935-93C4-4BCD-93E2-E3B085C9AB24}">
+                <p16:designElem xmlns:p16="http://schemas.microsoft.com/office/powerpoint/2015/main" val="1"/>
+              </p:ext>
+            </p:extLst>
+          </p:nvPr>
+        </p:nvSpPr>
+        <p:spPr>
+          <a:xfrm>
+            <a:off x="0" y="0"/>
+            <a:ext cx="12191999" cy="6857365"/>
+          </a:xfrm>
+          <a:prstGeom prst="rect">
+            <a:avLst/>
+          </a:prstGeom>
+          <a:ln>
+            <a:noFill/>
+          </a:ln>
+        </p:spPr>
+        <p:style>
+          <a:lnRef idx="2">
+            <a:schemeClr val="accent1">
+              <a:shade val="50000"/>
+            </a:schemeClr>
+          </a:lnRef>
+          <a:fillRef idx="1">
+            <a:schemeClr val="accent1"/>
+          </a:fillRef>
+          <a:effectRef idx="0">
+            <a:schemeClr val="accent1"/>
+          </a:effectRef>
+          <a:fontRef idx="minor">
+            <a:schemeClr val="lt1"/>
+          </a:fontRef>
+        </p:style>
+        <p:txBody>
+          <a:bodyPr rtlCol="0" anchor="ctr"/>
+          <a:lstStyle/>
+          <a:p>
+            <a:pPr algn="ctr"/>
+            <a:endParaRPr lang="en-US"/>
+          </a:p>
+        </p:txBody>
+      </p:sp>
+      <p:sp>
+        <p:nvSpPr>
+          <p:cNvPr id="10" name="Rectangle 9">
+            <a:extLst>
+              <a:ext uri="{FF2B5EF4-FFF2-40B4-BE49-F238E27FC236}">
+                <a16:creationId xmlns:a16="http://schemas.microsoft.com/office/drawing/2014/main" id="{5EB7D2A2-F448-44D4-938C-DC84CBCB3B1E}"/>
+              </a:ext>
+              <a:ext uri="{C183D7F6-B498-43B3-948B-1728B52AA6E4}">
+                <adec:decorative xmlns:adec="http://schemas.microsoft.com/office/drawing/2017/decorative" val="1"/>
+              </a:ext>
+            </a:extLst>
+          </p:cNvPr>
+          <p:cNvSpPr>
+            <a:spLocks noGrp="1" noRot="1" noChangeAspect="1" noMove="1" noResize="1" noEditPoints="1" noAdjustHandles="1" noChangeArrowheads="1" noChangeShapeType="1" noTextEdit="1"/>
+          </p:cNvSpPr>
+          <p:nvPr>
+            <p:extLst>
+              <p:ext uri="{386F3935-93C4-4BCD-93E2-E3B085C9AB24}">
+                <p16:designElem xmlns:p16="http://schemas.microsoft.com/office/powerpoint/2015/main" val="1"/>
+              </p:ext>
+            </p:extLst>
+          </p:nvPr>
+        </p:nvSpPr>
+        <p:spPr>
+          <a:xfrm>
+            <a:off x="0" y="2"/>
+            <a:ext cx="12192000" cy="4412583"/>
+          </a:xfrm>
+          <a:prstGeom prst="rect">
+            <a:avLst/>
+          </a:prstGeom>
+          <a:solidFill>
+            <a:schemeClr val="accent4"/>
+          </a:solidFill>
+          <a:ln>
+            <a:noFill/>
+          </a:ln>
+        </p:spPr>
+        <p:style>
+          <a:lnRef idx="2">
+            <a:schemeClr val="accent1">
+              <a:shade val="50000"/>
+            </a:schemeClr>
+          </a:lnRef>
+          <a:fillRef idx="1">
+            <a:schemeClr val="accent1"/>
+          </a:fillRef>
+          <a:effectRef idx="0">
+            <a:schemeClr val="accent1"/>
+          </a:effectRef>
+          <a:fontRef idx="minor">
+            <a:schemeClr val="lt1"/>
+          </a:fontRef>
+        </p:style>
+        <p:txBody>
+          <a:bodyPr rtlCol="0" anchor="ctr"/>
+          <a:lstStyle/>
+          <a:p>
+            <a:pPr algn="ctr"/>
+            <a:endParaRPr lang="en-US" dirty="0"/>
+          </a:p>
+        </p:txBody>
+      </p:sp>
+      <p:sp>
+        <p:nvSpPr>
+          <p:cNvPr id="12" name="Rectangle 11">
+            <a:extLst>
+              <a:ext uri="{FF2B5EF4-FFF2-40B4-BE49-F238E27FC236}">
+                <a16:creationId xmlns:a16="http://schemas.microsoft.com/office/drawing/2014/main" id="{871AEA07-1E14-44B4-8E55-64EF049CD66F}"/>
+              </a:ext>
+              <a:ext uri="{C183D7F6-B498-43B3-948B-1728B52AA6E4}">
+                <adec:decorative xmlns:adec="http://schemas.microsoft.com/office/drawing/2017/decorative" val="1"/>
+              </a:ext>
+            </a:extLst>
+          </p:cNvPr>
+          <p:cNvSpPr>
+            <a:spLocks noGrp="1" noRot="1" noChangeAspect="1" noMove="1" noResize="1" noEditPoints="1" noAdjustHandles="1" noChangeArrowheads="1" noChangeShapeType="1" noTextEdit="1"/>
+          </p:cNvSpPr>
+          <p:nvPr>
+            <p:extLst>
+              <p:ext uri="{386F3935-93C4-4BCD-93E2-E3B085C9AB24}">
+                <p16:designElem xmlns:p16="http://schemas.microsoft.com/office/powerpoint/2015/main" val="1"/>
+              </p:ext>
+            </p:extLst>
+          </p:nvPr>
+        </p:nvSpPr>
+        <p:spPr>
+          <a:xfrm>
+            <a:off x="596464" y="551962"/>
+            <a:ext cx="10999072" cy="4618549"/>
+          </a:xfrm>
+          <a:prstGeom prst="rect">
+            <a:avLst/>
+          </a:prstGeom>
+          <a:solidFill>
+            <a:schemeClr val="bg1"/>
+          </a:solidFill>
+          <a:ln>
+            <a:noFill/>
+          </a:ln>
+          <a:effectLst>
+            <a:outerShdw blurRad="139700" dist="127000" dir="5400000" algn="t" rotWithShape="0">
+              <a:prstClr val="black">
+                <a:alpha val="15000"/>
+              </a:prstClr>
+            </a:outerShdw>
+          </a:effectLst>
+        </p:spPr>
+        <p:style>
+          <a:lnRef idx="2">
+            <a:schemeClr val="accent1">
+              <a:shade val="50000"/>
+            </a:schemeClr>
+          </a:lnRef>
+          <a:fillRef idx="1">
+            <a:schemeClr val="accent1"/>
+          </a:fillRef>
+          <a:effectRef idx="0">
+            <a:schemeClr val="accent1"/>
+          </a:effectRef>
+          <a:fontRef idx="minor">
+            <a:schemeClr val="lt1"/>
+          </a:fontRef>
+        </p:style>
+        <p:txBody>
+          <a:bodyPr rtlCol="0" anchor="ctr"/>
+          <a:lstStyle/>
+          <a:p>
+            <a:pPr algn="ctr"/>
+            <a:endParaRPr lang="en-US"/>
+          </a:p>
+        </p:txBody>
+      </p:sp>
+      <p:sp>
+        <p:nvSpPr>
+          <p:cNvPr id="2" name="Tytuł 1">
+            <a:extLst>
+              <a:ext uri="{FF2B5EF4-FFF2-40B4-BE49-F238E27FC236}">
+                <a16:creationId xmlns:a16="http://schemas.microsoft.com/office/drawing/2014/main" id="{DA8C2151-90F9-2557-0778-A17580E09839}"/>
+              </a:ext>
+            </a:extLst>
+          </p:cNvPr>
+          <p:cNvSpPr>
+            <a:spLocks noGrp="1"/>
+          </p:cNvSpPr>
+          <p:nvPr>
+            <p:ph type="title"/>
+          </p:nvPr>
+        </p:nvSpPr>
+        <p:spPr>
+          <a:xfrm>
+            <a:off x="1524000" y="1293338"/>
+            <a:ext cx="9144000" cy="3274592"/>
+          </a:xfrm>
+        </p:spPr>
+        <p:txBody>
+          <a:bodyPr vert="horz" lIns="91440" tIns="45720" rIns="91440" bIns="45720" rtlCol="0" anchor="ctr">
+            <a:normAutofit/>
+          </a:bodyPr>
+          <a:lstStyle/>
+          <a:p>
+            <a:pPr algn="ctr"/>
+            <a:r>
+              <a:rPr lang="en-US" sz="7200" kern="1200" dirty="0" err="1">
+                <a:solidFill>
+                  <a:schemeClr val="tx1"/>
+                </a:solidFill>
+                <a:latin typeface="+mj-lt"/>
+                <a:ea typeface="+mj-ea"/>
+                <a:cs typeface="+mj-cs"/>
+              </a:rPr>
+              <a:t>Dziękuję</a:t>
+            </a:r>
+            <a:r>
+              <a:rPr lang="en-US" sz="7200" kern="1200" dirty="0">
+                <a:solidFill>
+                  <a:schemeClr val="tx1"/>
+                </a:solidFill>
+                <a:latin typeface="+mj-lt"/>
+                <a:ea typeface="+mj-ea"/>
+                <a:cs typeface="+mj-cs"/>
+              </a:rPr>
+              <a:t> za </a:t>
+            </a:r>
+            <a:r>
+              <a:rPr lang="en-US" sz="7200" kern="1200" dirty="0" err="1">
+                <a:solidFill>
+                  <a:schemeClr val="tx1"/>
+                </a:solidFill>
+                <a:latin typeface="+mj-lt"/>
+                <a:ea typeface="+mj-ea"/>
+                <a:cs typeface="+mj-cs"/>
+              </a:rPr>
+              <a:t>uwagę</a:t>
+            </a:r>
+            <a:endParaRPr lang="en-US" sz="7200" kern="1200" dirty="0">
+              <a:solidFill>
+                <a:schemeClr val="tx1"/>
+              </a:solidFill>
+              <a:latin typeface="+mj-lt"/>
+              <a:ea typeface="+mj-ea"/>
+              <a:cs typeface="+mj-cs"/>
+            </a:endParaRPr>
+          </a:p>
+        </p:txBody>
+      </p:sp>
+      <p:cxnSp>
+        <p:nvCxnSpPr>
+          <p:cNvPr id="14" name="Straight Connector 13">
+            <a:extLst>
+              <a:ext uri="{FF2B5EF4-FFF2-40B4-BE49-F238E27FC236}">
+                <a16:creationId xmlns:a16="http://schemas.microsoft.com/office/drawing/2014/main" id="{F7C8EA93-3210-4C62-99E9-153C275E3A87}"/>
+              </a:ext>
+              <a:ext uri="{C183D7F6-B498-43B3-948B-1728B52AA6E4}">
+                <adec:decorative xmlns:adec="http://schemas.microsoft.com/office/drawing/2017/decorative" val="1"/>
+              </a:ext>
+            </a:extLst>
+          </p:cNvPr>
+          <p:cNvCxnSpPr>
+            <a:cxnSpLocks noGrp="1" noRot="1" noChangeAspect="1" noMove="1" noResize="1" noEditPoints="1" noAdjustHandles="1" noChangeArrowheads="1" noChangeShapeType="1"/>
+          </p:cNvCxnSpPr>
+          <p:nvPr>
+            <p:extLst>
+              <p:ext uri="{386F3935-93C4-4BCD-93E2-E3B085C9AB24}">
+                <p16:designElem xmlns:p16="http://schemas.microsoft.com/office/powerpoint/2015/main" val="1"/>
+              </p:ext>
+            </p:extLst>
+          </p:nvPr>
+        </p:nvCxnSpPr>
+        <p:spPr>
+          <a:xfrm flipH="1">
+            <a:off x="596464" y="6354708"/>
+            <a:ext cx="11000232" cy="0"/>
+          </a:xfrm>
+          <a:prstGeom prst="line">
+            <a:avLst/>
+          </a:prstGeom>
+          <a:ln w="101600">
+            <a:solidFill>
+              <a:schemeClr val="accent4"/>
+            </a:solidFill>
+          </a:ln>
+        </p:spPr>
+        <p:style>
+          <a:lnRef idx="1">
+            <a:schemeClr val="accent1"/>
+          </a:lnRef>
+          <a:fillRef idx="0">
+            <a:schemeClr val="accent1"/>
+          </a:fillRef>
+          <a:effectRef idx="0">
+            <a:schemeClr val="accent1"/>
+          </a:effectRef>
+          <a:fontRef idx="minor">
+            <a:schemeClr val="tx1"/>
+          </a:fontRef>
+        </p:style>
+      </p:cxnSp>
+    </p:spTree>
+    <p:extLst>
+      <p:ext uri="{BB962C8B-B14F-4D97-AF65-F5344CB8AC3E}">
+        <p14:creationId xmlns:p14="http://schemas.microsoft.com/office/powerpoint/2010/main" val="2756696132"/>
       </p:ext>
     </p:extLst>
   </p:cSld>
@@ -27324,7 +29134,7 @@
         </p:nvSpPr>
         <p:spPr>
           <a:xfrm>
-            <a:off x="6096000" y="1372905"/>
+            <a:off x="5982788" y="229222"/>
             <a:ext cx="5224272" cy="4305519"/>
           </a:xfrm>
         </p:spPr>
@@ -27335,26 +29145,42 @@
           <a:lstStyle/>
           <a:p>
             <a:r>
-              <a:rPr lang="pl-PL" sz="2000"/>
-              <a:t>max_depth = 15</a:t>
-            </a:r>
-          </a:p>
-          <a:p>
-            <a:r>
-              <a:rPr lang="pl-PL" sz="2000"/>
-              <a:t>max_feautures = 13</a:t>
-            </a:r>
-          </a:p>
-          <a:p>
-            <a:r>
-              <a:rPr lang="pl-PL" sz="2000"/>
-              <a:t>min_samples_leaf = 10</a:t>
-            </a:r>
-          </a:p>
-          <a:p>
-            <a:r>
-              <a:rPr lang="pl-PL" sz="2000"/>
-              <a:t>min_samples_split = 20</a:t>
+              <a:rPr lang="pl-PL" sz="2000" dirty="0" err="1"/>
+              <a:t>max_depth</a:t>
+            </a:r>
+            <a:r>
+              <a:rPr lang="pl-PL" sz="2000" dirty="0"/>
+              <a:t> = 15</a:t>
+            </a:r>
+          </a:p>
+          <a:p>
+            <a:r>
+              <a:rPr lang="pl-PL" sz="2000" dirty="0" err="1"/>
+              <a:t>max_feautures</a:t>
+            </a:r>
+            <a:r>
+              <a:rPr lang="pl-PL" sz="2000" dirty="0"/>
+              <a:t> = 13</a:t>
+            </a:r>
+          </a:p>
+          <a:p>
+            <a:r>
+              <a:rPr lang="pl-PL" sz="2000" dirty="0" err="1"/>
+              <a:t>min_samples_leaf</a:t>
+            </a:r>
+            <a:r>
+              <a:rPr lang="pl-PL" sz="2000" dirty="0"/>
+              <a:t> = 10</a:t>
+            </a:r>
+          </a:p>
+          <a:p>
+            <a:r>
+              <a:rPr lang="pl-PL" sz="2000" dirty="0" err="1"/>
+              <a:t>min_samples_split</a:t>
+            </a:r>
+            <a:r>
+              <a:rPr lang="pl-PL" sz="2000" dirty="0"/>
+              <a:t> = 20</a:t>
             </a:r>
           </a:p>
         </p:txBody>
@@ -27422,6 +29248,36 @@
           </a:p>
         </p:txBody>
       </p:sp>
+      <p:pic>
+        <p:nvPicPr>
+          <p:cNvPr id="4" name="Obraz 3">
+            <a:extLst>
+              <a:ext uri="{FF2B5EF4-FFF2-40B4-BE49-F238E27FC236}">
+                <a16:creationId xmlns:a16="http://schemas.microsoft.com/office/drawing/2014/main" id="{240D5FDF-D285-F24E-0B5D-633A469C3DC2}"/>
+              </a:ext>
+            </a:extLst>
+          </p:cNvPr>
+          <p:cNvPicPr>
+            <a:picLocks noChangeAspect="1"/>
+          </p:cNvPicPr>
+          <p:nvPr/>
+        </p:nvPicPr>
+        <p:blipFill>
+          <a:blip r:embed="rId3"/>
+          <a:stretch>
+            <a:fillRect/>
+          </a:stretch>
+        </p:blipFill>
+        <p:spPr>
+          <a:xfrm>
+            <a:off x="7909301" y="3154317"/>
+            <a:ext cx="3670300" cy="2870200"/>
+          </a:xfrm>
+          <a:prstGeom prst="rect">
+            <a:avLst/>
+          </a:prstGeom>
+        </p:spPr>
+      </p:pic>
     </p:spTree>
     <p:extLst>
       <p:ext uri="{BB962C8B-B14F-4D97-AF65-F5344CB8AC3E}">

</xml_diff>